<commit_message>
Big Upgrade Uno HWD
</commit_message>
<xml_diff>
--- a/Mini_Project_.pptx
+++ b/Mini_Project_.pptx
@@ -5,10 +5,10 @@
     <p:sldMasterId id="2147483648" r:id="rId1"/>
   </p:sldMasterIdLst>
   <p:notesMasterIdLst>
-    <p:notesMasterId r:id="rId33"/>
+    <p:notesMasterId r:id="rId34"/>
   </p:notesMasterIdLst>
   <p:handoutMasterIdLst>
-    <p:handoutMasterId r:id="rId34"/>
+    <p:handoutMasterId r:id="rId35"/>
   </p:handoutMasterIdLst>
   <p:sldIdLst>
     <p:sldId id="2524" r:id="rId2"/>
@@ -27,21 +27,22 @@
     <p:sldId id="2590" r:id="rId15"/>
     <p:sldId id="2591" r:id="rId16"/>
     <p:sldId id="2606" r:id="rId17"/>
-    <p:sldId id="2607" r:id="rId18"/>
-    <p:sldId id="2604" r:id="rId19"/>
-    <p:sldId id="2608" r:id="rId20"/>
-    <p:sldId id="2597" r:id="rId21"/>
-    <p:sldId id="2600" r:id="rId22"/>
-    <p:sldId id="2601" r:id="rId23"/>
-    <p:sldId id="2602" r:id="rId24"/>
-    <p:sldId id="2610" r:id="rId25"/>
-    <p:sldId id="2611" r:id="rId26"/>
-    <p:sldId id="2612" r:id="rId27"/>
-    <p:sldId id="2613" r:id="rId28"/>
-    <p:sldId id="2614" r:id="rId29"/>
-    <p:sldId id="2615" r:id="rId30"/>
-    <p:sldId id="2616" r:id="rId31"/>
-    <p:sldId id="2609" r:id="rId32"/>
+    <p:sldId id="2617" r:id="rId18"/>
+    <p:sldId id="2607" r:id="rId19"/>
+    <p:sldId id="2604" r:id="rId20"/>
+    <p:sldId id="2608" r:id="rId21"/>
+    <p:sldId id="2597" r:id="rId22"/>
+    <p:sldId id="2600" r:id="rId23"/>
+    <p:sldId id="2601" r:id="rId24"/>
+    <p:sldId id="2602" r:id="rId25"/>
+    <p:sldId id="2610" r:id="rId26"/>
+    <p:sldId id="2611" r:id="rId27"/>
+    <p:sldId id="2612" r:id="rId28"/>
+    <p:sldId id="2613" r:id="rId29"/>
+    <p:sldId id="2614" r:id="rId30"/>
+    <p:sldId id="2615" r:id="rId31"/>
+    <p:sldId id="2616" r:id="rId32"/>
+    <p:sldId id="2609" r:id="rId33"/>
   </p:sldIdLst>
   <p:sldSz cx="12192000" cy="6858000"/>
   <p:notesSz cx="6858000" cy="9144000"/>
@@ -250,7 +251,7 @@
           <a:p>
             <a:fld id="{0248B25D-8766-427E-8C9E-4845048D8DFC}" type="datetimeFigureOut">
               <a:rPr lang="en-US" smtClean="0"/>
-              <a:t>9/27/2022</a:t>
+              <a:t>10/22/2022</a:t>
             </a:fld>
             <a:endParaRPr lang="en-US" dirty="0"/>
           </a:p>
@@ -415,7 +416,7 @@
           <a:p>
             <a:fld id="{426F439B-391B-4B41-826A-951FCF412C34}" type="datetimeFigureOut">
               <a:rPr lang="en-US" smtClean="0"/>
-              <a:t>9/27/2022</a:t>
+              <a:t>10/22/2022</a:t>
             </a:fld>
             <a:endParaRPr lang="en-US" dirty="0"/>
           </a:p>
@@ -1373,6 +1374,11 @@
         </p:txBody>
       </p:sp>
     </p:spTree>
+    <p:extLst>
+      <p:ext uri="{BB962C8B-B14F-4D97-AF65-F5344CB8AC3E}">
+        <p14:creationId xmlns:p14="http://schemas.microsoft.com/office/powerpoint/2010/main" val="3686552547"/>
+      </p:ext>
+    </p:extLst>
   </p:cSld>
   <p:clrMapOvr>
     <a:masterClrMapping/>
@@ -1452,11 +1458,6 @@
         </p:txBody>
       </p:sp>
     </p:spTree>
-    <p:extLst>
-      <p:ext uri="{BB962C8B-B14F-4D97-AF65-F5344CB8AC3E}">
-        <p14:creationId xmlns:p14="http://schemas.microsoft.com/office/powerpoint/2010/main" val="1598106047"/>
-      </p:ext>
-    </p:extLst>
   </p:cSld>
   <p:clrMapOvr>
     <a:masterClrMapping/>
@@ -1692,13 +1693,18 @@
           <a:p>
             <a:fld id="{3CFA0038-7055-434C-B6C4-B8C69565C600}" type="slidenum">
               <a:rPr lang="en-US" smtClean="0"/>
-              <a:t>21</a:t>
+              <a:t>20</a:t>
             </a:fld>
             <a:endParaRPr lang="en-US" dirty="0"/>
           </a:p>
         </p:txBody>
       </p:sp>
     </p:spTree>
+    <p:extLst>
+      <p:ext uri="{BB962C8B-B14F-4D97-AF65-F5344CB8AC3E}">
+        <p14:creationId xmlns:p14="http://schemas.microsoft.com/office/powerpoint/2010/main" val="1598106047"/>
+      </p:ext>
+    </p:extLst>
   </p:cSld>
   <p:clrMapOvr>
     <a:masterClrMapping/>
@@ -1929,18 +1935,13 @@
           <a:p>
             <a:fld id="{3CFA0038-7055-434C-B6C4-B8C69565C600}" type="slidenum">
               <a:rPr lang="en-US" smtClean="0"/>
-              <a:t>25</a:t>
+              <a:t>24</a:t>
             </a:fld>
             <a:endParaRPr lang="en-US" dirty="0"/>
           </a:p>
         </p:txBody>
       </p:sp>
     </p:spTree>
-    <p:extLst>
-      <p:ext uri="{BB962C8B-B14F-4D97-AF65-F5344CB8AC3E}">
-        <p14:creationId xmlns:p14="http://schemas.microsoft.com/office/powerpoint/2010/main" val="1434296612"/>
-      </p:ext>
-    </p:extLst>
   </p:cSld>
   <p:clrMapOvr>
     <a:masterClrMapping/>
@@ -2022,7 +2023,7 @@
     </p:spTree>
     <p:extLst>
       <p:ext uri="{BB962C8B-B14F-4D97-AF65-F5344CB8AC3E}">
-        <p14:creationId xmlns:p14="http://schemas.microsoft.com/office/powerpoint/2010/main" val="3834312279"/>
+        <p14:creationId xmlns:p14="http://schemas.microsoft.com/office/powerpoint/2010/main" val="1434296612"/>
       </p:ext>
     </p:extLst>
   </p:cSld>
@@ -2106,7 +2107,7 @@
     </p:spTree>
     <p:extLst>
       <p:ext uri="{BB962C8B-B14F-4D97-AF65-F5344CB8AC3E}">
-        <p14:creationId xmlns:p14="http://schemas.microsoft.com/office/powerpoint/2010/main" val="228165347"/>
+        <p14:creationId xmlns:p14="http://schemas.microsoft.com/office/powerpoint/2010/main" val="3834312279"/>
       </p:ext>
     </p:extLst>
   </p:cSld>
@@ -2190,7 +2191,7 @@
     </p:spTree>
     <p:extLst>
       <p:ext uri="{BB962C8B-B14F-4D97-AF65-F5344CB8AC3E}">
-        <p14:creationId xmlns:p14="http://schemas.microsoft.com/office/powerpoint/2010/main" val="3528154606"/>
+        <p14:creationId xmlns:p14="http://schemas.microsoft.com/office/powerpoint/2010/main" val="228165347"/>
       </p:ext>
     </p:extLst>
   </p:cSld>
@@ -2274,7 +2275,7 @@
     </p:spTree>
     <p:extLst>
       <p:ext uri="{BB962C8B-B14F-4D97-AF65-F5344CB8AC3E}">
-        <p14:creationId xmlns:p14="http://schemas.microsoft.com/office/powerpoint/2010/main" val="2007017885"/>
+        <p14:creationId xmlns:p14="http://schemas.microsoft.com/office/powerpoint/2010/main" val="3528154606"/>
       </p:ext>
     </p:extLst>
   </p:cSld>
@@ -2350,6 +2351,90 @@
             <a:fld id="{3CFA0038-7055-434C-B6C4-B8C69565C600}" type="slidenum">
               <a:rPr lang="en-US" smtClean="0"/>
               <a:t>30</a:t>
+            </a:fld>
+            <a:endParaRPr lang="en-US" dirty="0"/>
+          </a:p>
+        </p:txBody>
+      </p:sp>
+    </p:spTree>
+    <p:extLst>
+      <p:ext uri="{BB962C8B-B14F-4D97-AF65-F5344CB8AC3E}">
+        <p14:creationId xmlns:p14="http://schemas.microsoft.com/office/powerpoint/2010/main" val="2007017885"/>
+      </p:ext>
+    </p:extLst>
+  </p:cSld>
+  <p:clrMapOvr>
+    <a:masterClrMapping/>
+  </p:clrMapOvr>
+</p:notes>
+</file>
+
+<file path=ppt/notesSlides/notesSlide29.xml><?xml version="1.0" encoding="utf-8"?>
+<p:notes xmlns:a="http://schemas.openxmlformats.org/drawingml/2006/main" xmlns:r="http://schemas.openxmlformats.org/officeDocument/2006/relationships" xmlns:p="http://schemas.openxmlformats.org/presentationml/2006/main">
+  <p:cSld>
+    <p:spTree>
+      <p:nvGrpSpPr>
+        <p:cNvPr id="1" name=""/>
+        <p:cNvGrpSpPr/>
+        <p:nvPr/>
+      </p:nvGrpSpPr>
+      <p:grpSpPr>
+        <a:xfrm>
+          <a:off x="0" y="0"/>
+          <a:ext cx="0" cy="0"/>
+          <a:chOff x="0" y="0"/>
+          <a:chExt cx="0" cy="0"/>
+        </a:xfrm>
+      </p:grpSpPr>
+      <p:sp>
+        <p:nvSpPr>
+          <p:cNvPr id="2" name="Slide Image Placeholder 1"/>
+          <p:cNvSpPr>
+            <a:spLocks noGrp="1" noRot="1" noChangeAspect="1"/>
+          </p:cNvSpPr>
+          <p:nvPr>
+            <p:ph type="sldImg"/>
+          </p:nvPr>
+        </p:nvSpPr>
+        <p:spPr/>
+      </p:sp>
+      <p:sp>
+        <p:nvSpPr>
+          <p:cNvPr id="3" name="Notes Placeholder 2"/>
+          <p:cNvSpPr>
+            <a:spLocks noGrp="1"/>
+          </p:cNvSpPr>
+          <p:nvPr>
+            <p:ph type="body" idx="1"/>
+          </p:nvPr>
+        </p:nvSpPr>
+        <p:spPr/>
+        <p:txBody>
+          <a:bodyPr/>
+          <a:lstStyle/>
+          <a:p>
+            <a:endParaRPr lang="en-US" dirty="0"/>
+          </a:p>
+        </p:txBody>
+      </p:sp>
+      <p:sp>
+        <p:nvSpPr>
+          <p:cNvPr id="4" name="Slide Number Placeholder 3"/>
+          <p:cNvSpPr>
+            <a:spLocks noGrp="1"/>
+          </p:cNvSpPr>
+          <p:nvPr>
+            <p:ph type="sldNum" sz="quarter" idx="5"/>
+          </p:nvPr>
+        </p:nvSpPr>
+        <p:spPr/>
+        <p:txBody>
+          <a:bodyPr/>
+          <a:lstStyle/>
+          <a:p>
+            <a:fld id="{3CFA0038-7055-434C-B6C4-B8C69565C600}" type="slidenum">
+              <a:rPr lang="en-US" smtClean="0"/>
+              <a:t>31</a:t>
             </a:fld>
             <a:endParaRPr lang="en-US" dirty="0"/>
           </a:p>
@@ -18981,12 +19066,12 @@
         <p:spPr>
           <a:xfrm>
             <a:off x="157527" y="182827"/>
-            <a:ext cx="7213331" cy="654675"/>
+            <a:ext cx="8151586" cy="654675"/>
           </a:xfrm>
         </p:spPr>
         <p:txBody>
           <a:bodyPr>
-            <a:normAutofit/>
+            <a:normAutofit fontScale="90000"/>
           </a:bodyPr>
           <a:lstStyle/>
           <a:p>
@@ -18996,7 +19081,7 @@
                   <a:srgbClr val="5DAAB0"/>
                 </a:solidFill>
               </a:rPr>
-              <a:t>Self –Supervised Workflow</a:t>
+              <a:t>Self –Supervised Contrastive Workflow</a:t>
             </a:r>
           </a:p>
         </p:txBody>
@@ -19024,7 +19109,7 @@
         </p:blipFill>
         <p:spPr bwMode="auto">
           <a:xfrm>
-            <a:off x="3210091" y="941387"/>
+            <a:off x="530502" y="941387"/>
             <a:ext cx="4810125" cy="5916613"/>
           </a:xfrm>
           <a:prstGeom prst="rect">
@@ -19065,6 +19150,86 @@
           </a:extLst>
         </p:spPr>
       </p:pic>
+      <p:sp>
+        <p:nvSpPr>
+          <p:cNvPr id="2" name="TextBox 1">
+            <a:extLst>
+              <a:ext uri="{FF2B5EF4-FFF2-40B4-BE49-F238E27FC236}">
+                <a16:creationId xmlns:a16="http://schemas.microsoft.com/office/drawing/2014/main" id="{7B0E9626-90F8-1C91-D90B-F018E7921B50}"/>
+              </a:ext>
+            </a:extLst>
+          </p:cNvPr>
+          <p:cNvSpPr txBox="1"/>
+          <p:nvPr/>
+        </p:nvSpPr>
+        <p:spPr>
+          <a:xfrm>
+            <a:off x="6257677" y="1192694"/>
+            <a:ext cx="5403821" cy="5355312"/>
+          </a:xfrm>
+          <a:prstGeom prst="rect">
+            <a:avLst/>
+          </a:prstGeom>
+          <a:noFill/>
+        </p:spPr>
+        <p:txBody>
+          <a:bodyPr wrap="square" rtlCol="0">
+            <a:spAutoFit/>
+          </a:bodyPr>
+          <a:lstStyle/>
+          <a:p>
+            <a:r>
+              <a:rPr lang="en-IN" dirty="0"/>
+              <a:t>Contrastive Self Supervised Learning</a:t>
+            </a:r>
+          </a:p>
+          <a:p>
+            <a:endParaRPr lang="en-IN" dirty="0"/>
+          </a:p>
+          <a:p>
+            <a:r>
+              <a:rPr lang="en-IN" dirty="0"/>
+              <a:t>In contrastive learning the positive and negative images are processed by the same model</a:t>
+            </a:r>
+          </a:p>
+          <a:p>
+            <a:endParaRPr lang="en-IN" dirty="0"/>
+          </a:p>
+          <a:p>
+            <a:r>
+              <a:rPr lang="en-IN" dirty="0"/>
+              <a:t>The basic intuition is that the embedding of images of the same class must to closer to embeddings of images with the same class than the other class</a:t>
+            </a:r>
+          </a:p>
+          <a:p>
+            <a:endParaRPr lang="en-IN" dirty="0"/>
+          </a:p>
+          <a:p>
+            <a:r>
+              <a:rPr lang="en-IN" dirty="0"/>
+              <a:t>Using the above intuition we use different loss functions which represents the similarity between these two embeddings</a:t>
+            </a:r>
+          </a:p>
+          <a:p>
+            <a:endParaRPr lang="en-IN" dirty="0"/>
+          </a:p>
+          <a:p>
+            <a:r>
+              <a:rPr lang="en-IN" dirty="0"/>
+              <a:t>Using this loss we back prop to the CNN encoder and updating the weights</a:t>
+            </a:r>
+          </a:p>
+          <a:p>
+            <a:endParaRPr lang="en-IN" dirty="0"/>
+          </a:p>
+          <a:p>
+            <a:r>
+              <a:rPr lang="en-IN" dirty="0"/>
+              <a:t>The problem with using CSSL is they may reach trivial solutions or need large batches thus more RAM to process the negative samples</a:t>
+            </a:r>
+          </a:p>
+        </p:txBody>
+      </p:sp>
     </p:spTree>
     <p:extLst>
       <p:ext uri="{BB962C8B-B14F-4D97-AF65-F5344CB8AC3E}">
@@ -19108,12 +19273,12 @@
         <p:spPr>
           <a:xfrm>
             <a:off x="157527" y="182827"/>
-            <a:ext cx="10364897" cy="654675"/>
+            <a:ext cx="8954668" cy="654675"/>
           </a:xfrm>
         </p:spPr>
         <p:txBody>
           <a:bodyPr>
-            <a:normAutofit/>
+            <a:normAutofit fontScale="90000"/>
           </a:bodyPr>
           <a:lstStyle/>
           <a:p>
@@ -19123,14 +19288,14 @@
                   <a:srgbClr val="5DAAB0"/>
                 </a:solidFill>
               </a:rPr>
-              <a:t>Self –Supervised Workflow Augmentation</a:t>
+              <a:t>Self –Supervised Non Contrastive Workflow</a:t>
             </a:r>
           </a:p>
         </p:txBody>
       </p:sp>
       <p:pic>
         <p:nvPicPr>
-          <p:cNvPr id="3074" name="Picture 2"/>
+          <p:cNvPr id="2050" name="Picture 2"/>
           <p:cNvPicPr>
             <a:picLocks noChangeAspect="1" noChangeArrowheads="1"/>
           </p:cNvPicPr>
@@ -19151,8 +19316,8 @@
         </p:blipFill>
         <p:spPr bwMode="auto">
           <a:xfrm>
-            <a:off x="860197" y="1201003"/>
-            <a:ext cx="10554555" cy="4708478"/>
+            <a:off x="530502" y="941387"/>
+            <a:ext cx="4810125" cy="5916613"/>
           </a:xfrm>
           <a:prstGeom prst="rect">
             <a:avLst/>
@@ -19192,10 +19357,87 @@
           </a:extLst>
         </p:spPr>
       </p:pic>
+      <p:sp>
+        <p:nvSpPr>
+          <p:cNvPr id="2" name="TextBox 1">
+            <a:extLst>
+              <a:ext uri="{FF2B5EF4-FFF2-40B4-BE49-F238E27FC236}">
+                <a16:creationId xmlns:a16="http://schemas.microsoft.com/office/drawing/2014/main" id="{7B0E9626-90F8-1C91-D90B-F018E7921B50}"/>
+              </a:ext>
+            </a:extLst>
+          </p:cNvPr>
+          <p:cNvSpPr txBox="1"/>
+          <p:nvPr/>
+        </p:nvSpPr>
+        <p:spPr>
+          <a:xfrm>
+            <a:off x="6257677" y="1630016"/>
+            <a:ext cx="5403821" cy="4247317"/>
+          </a:xfrm>
+          <a:prstGeom prst="rect">
+            <a:avLst/>
+          </a:prstGeom>
+          <a:noFill/>
+        </p:spPr>
+        <p:txBody>
+          <a:bodyPr wrap="square" rtlCol="0">
+            <a:spAutoFit/>
+          </a:bodyPr>
+          <a:lstStyle/>
+          <a:p>
+            <a:r>
+              <a:rPr lang="en-IN" dirty="0"/>
+              <a:t>Contrastive Non Self Supervised Learning</a:t>
+            </a:r>
+          </a:p>
+          <a:p>
+            <a:endParaRPr lang="en-IN" dirty="0"/>
+          </a:p>
+          <a:p>
+            <a:r>
+              <a:rPr lang="en-IN" dirty="0"/>
+              <a:t>In non contrastive learning only the positive samples are processed by the two different model</a:t>
+            </a:r>
+          </a:p>
+          <a:p>
+            <a:endParaRPr lang="en-IN" dirty="0"/>
+          </a:p>
+          <a:p>
+            <a:r>
+              <a:rPr lang="en-IN" dirty="0"/>
+              <a:t>The 2 different models “Student Model” and “Teacher Model”</a:t>
+            </a:r>
+          </a:p>
+          <a:p>
+            <a:endParaRPr lang="en-IN" dirty="0"/>
+          </a:p>
+          <a:p>
+            <a:r>
+              <a:rPr lang="en-IN" dirty="0"/>
+              <a:t>The updating of the weights is done by using distillation</a:t>
+            </a:r>
+          </a:p>
+          <a:p>
+            <a:endParaRPr lang="en-IN" dirty="0"/>
+          </a:p>
+          <a:p>
+            <a:r>
+              <a:rPr lang="en-IN" dirty="0"/>
+              <a:t>The loss function is “closeness” between the embedding of the teacher and the student model</a:t>
+            </a:r>
+          </a:p>
+          <a:p>
+            <a:endParaRPr lang="en-IN" dirty="0"/>
+          </a:p>
+          <a:p>
+            <a:endParaRPr lang="en-IN" dirty="0"/>
+          </a:p>
+        </p:txBody>
+      </p:sp>
     </p:spTree>
     <p:extLst>
       <p:ext uri="{BB962C8B-B14F-4D97-AF65-F5344CB8AC3E}">
-        <p14:creationId xmlns:p14="http://schemas.microsoft.com/office/powerpoint/2010/main" val="1425906459"/>
+        <p14:creationId xmlns:p14="http://schemas.microsoft.com/office/powerpoint/2010/main" val="3041415750"/>
       </p:ext>
     </p:extLst>
   </p:cSld>
@@ -19224,6 +19466,133 @@
       </p:grpSpPr>
       <p:sp>
         <p:nvSpPr>
+          <p:cNvPr id="8" name="Title 7"/>
+          <p:cNvSpPr>
+            <a:spLocks noGrp="1"/>
+          </p:cNvSpPr>
+          <p:nvPr>
+            <p:ph type="title"/>
+          </p:nvPr>
+        </p:nvSpPr>
+        <p:spPr>
+          <a:xfrm>
+            <a:off x="157527" y="182827"/>
+            <a:ext cx="10364897" cy="654675"/>
+          </a:xfrm>
+        </p:spPr>
+        <p:txBody>
+          <a:bodyPr>
+            <a:normAutofit/>
+          </a:bodyPr>
+          <a:lstStyle/>
+          <a:p>
+            <a:r>
+              <a:rPr lang="en-US" dirty="0">
+                <a:solidFill>
+                  <a:srgbClr val="5DAAB0"/>
+                </a:solidFill>
+              </a:rPr>
+              <a:t>Self –Supervised Workflow Augmentation</a:t>
+            </a:r>
+          </a:p>
+        </p:txBody>
+      </p:sp>
+      <p:pic>
+        <p:nvPicPr>
+          <p:cNvPr id="3074" name="Picture 2"/>
+          <p:cNvPicPr>
+            <a:picLocks noChangeAspect="1" noChangeArrowheads="1"/>
+          </p:cNvPicPr>
+          <p:nvPr/>
+        </p:nvPicPr>
+        <p:blipFill>
+          <a:blip r:embed="rId3">
+            <a:extLst>
+              <a:ext uri="{28A0092B-C50C-407E-A947-70E740481C1C}">
+                <a14:useLocalDpi xmlns:a14="http://schemas.microsoft.com/office/drawing/2010/main" val="0"/>
+              </a:ext>
+            </a:extLst>
+          </a:blip>
+          <a:srcRect/>
+          <a:stretch>
+            <a:fillRect/>
+          </a:stretch>
+        </p:blipFill>
+        <p:spPr bwMode="auto">
+          <a:xfrm>
+            <a:off x="860197" y="1201003"/>
+            <a:ext cx="10554555" cy="4708478"/>
+          </a:xfrm>
+          <a:prstGeom prst="rect">
+            <a:avLst/>
+          </a:prstGeom>
+          <a:noFill/>
+          <a:ln>
+            <a:noFill/>
+          </a:ln>
+          <a:effectLst/>
+          <a:extLst>
+            <a:ext uri="{909E8E84-426E-40DD-AFC4-6F175D3DCCD1}">
+              <a14:hiddenFill xmlns:a14="http://schemas.microsoft.com/office/drawing/2010/main">
+                <a:solidFill>
+                  <a:schemeClr val="accent1"/>
+                </a:solidFill>
+              </a14:hiddenFill>
+            </a:ext>
+            <a:ext uri="{91240B29-F687-4F45-9708-019B960494DF}">
+              <a14:hiddenLine xmlns:a14="http://schemas.microsoft.com/office/drawing/2010/main" w="9525">
+                <a:solidFill>
+                  <a:schemeClr val="tx1"/>
+                </a:solidFill>
+                <a:miter lim="800000"/>
+                <a:headEnd/>
+                <a:tailEnd/>
+              </a14:hiddenLine>
+            </a:ext>
+            <a:ext uri="{AF507438-7753-43E0-B8FC-AC1667EBCBE1}">
+              <a14:hiddenEffects xmlns:a14="http://schemas.microsoft.com/office/drawing/2010/main">
+                <a:effectLst>
+                  <a:outerShdw dist="35921" dir="2700000" algn="ctr" rotWithShape="0">
+                    <a:schemeClr val="bg2"/>
+                  </a:outerShdw>
+                </a:effectLst>
+              </a14:hiddenEffects>
+            </a:ext>
+          </a:extLst>
+        </p:spPr>
+      </p:pic>
+    </p:spTree>
+    <p:extLst>
+      <p:ext uri="{BB962C8B-B14F-4D97-AF65-F5344CB8AC3E}">
+        <p14:creationId xmlns:p14="http://schemas.microsoft.com/office/powerpoint/2010/main" val="1425906459"/>
+      </p:ext>
+    </p:extLst>
+  </p:cSld>
+  <p:clrMapOvr>
+    <a:masterClrMapping/>
+  </p:clrMapOvr>
+</p:sld>
+</file>
+
+<file path=ppt/slides/slide19.xml><?xml version="1.0" encoding="utf-8"?>
+<p:sld xmlns:a="http://schemas.openxmlformats.org/drawingml/2006/main" xmlns:r="http://schemas.openxmlformats.org/officeDocument/2006/relationships" xmlns:p="http://schemas.openxmlformats.org/presentationml/2006/main">
+  <p:cSld>
+    <p:spTree>
+      <p:nvGrpSpPr>
+        <p:cNvPr id="1" name=""/>
+        <p:cNvGrpSpPr/>
+        <p:nvPr/>
+      </p:nvGrpSpPr>
+      <p:grpSpPr>
+        <a:xfrm>
+          <a:off x="0" y="0"/>
+          <a:ext cx="0" cy="0"/>
+          <a:chOff x="0" y="0"/>
+          <a:chExt cx="0" cy="0"/>
+        </a:xfrm>
+      </p:grpSpPr>
+      <p:sp>
+        <p:nvSpPr>
           <p:cNvPr id="2" name="TextBox 1"/>
           <p:cNvSpPr txBox="1"/>
           <p:nvPr/>
@@ -19265,7 +19634,7 @@
           <p:nvPr>
             <p:extLst>
               <p:ext uri="{D42A27DB-BD31-4B8C-83A1-F6EECF244321}">
-                <p14:modId xmlns:p14="http://schemas.microsoft.com/office/powerpoint/2010/main" val="997991343"/>
+                <p14:modId xmlns:p14="http://schemas.microsoft.com/office/powerpoint/2010/main" val="3638129215"/>
               </p:ext>
             </p:extLst>
           </p:nvPr>
@@ -19281,28 +19650,35 @@
                 <a:tableStyleId>{5C22544A-7EE6-4342-B048-85BDC9FD1C3A}</a:tableStyleId>
               </a:tblPr>
               <a:tblGrid>
-                <a:gridCol w="2866292">
+                <a:gridCol w="2302938">
                   <a:extLst>
                     <a:ext uri="{9D8B030D-6E8A-4147-A177-3AD203B41FA5}">
                       <a16:colId xmlns:a16="http://schemas.microsoft.com/office/drawing/2014/main" val="20000"/>
                     </a:ext>
                   </a:extLst>
                 </a:gridCol>
-                <a:gridCol w="2866292">
+                <a:gridCol w="2302938">
                   <a:extLst>
                     <a:ext uri="{9D8B030D-6E8A-4147-A177-3AD203B41FA5}">
                       <a16:colId xmlns:a16="http://schemas.microsoft.com/office/drawing/2014/main" val="20001"/>
                     </a:ext>
                   </a:extLst>
                 </a:gridCol>
-                <a:gridCol w="2866292">
+                <a:gridCol w="2302938">
                   <a:extLst>
                     <a:ext uri="{9D8B030D-6E8A-4147-A177-3AD203B41FA5}">
                       <a16:colId xmlns:a16="http://schemas.microsoft.com/office/drawing/2014/main" val="20002"/>
                     </a:ext>
                   </a:extLst>
                 </a:gridCol>
-                <a:gridCol w="3118253">
+                <a:gridCol w="2302938">
+                  <a:extLst>
+                    <a:ext uri="{9D8B030D-6E8A-4147-A177-3AD203B41FA5}">
+                      <a16:colId xmlns:a16="http://schemas.microsoft.com/office/drawing/2014/main" val="2309602095"/>
+                    </a:ext>
+                  </a:extLst>
+                </a:gridCol>
+                <a:gridCol w="2505377">
                   <a:extLst>
                     <a:ext uri="{9D8B030D-6E8A-4147-A177-3AD203B41FA5}">
                       <a16:colId xmlns:a16="http://schemas.microsoft.com/office/drawing/2014/main" val="20003"/>
@@ -19352,6 +19728,20 @@
                         <a:t>Model</a:t>
                       </a:r>
                       <a:endParaRPr lang="en-IN" dirty="0"/>
+                    </a:p>
+                  </a:txBody>
+                  <a:tcPr/>
+                </a:tc>
+                <a:tc>
+                  <a:txBody>
+                    <a:bodyPr/>
+                    <a:lstStyle/>
+                    <a:p>
+                      <a:pPr algn="ctr"/>
+                      <a:r>
+                        <a:rPr lang="en-IN" dirty="0"/>
+                        <a:t>Methods</a:t>
+                      </a:r>
                     </a:p>
                   </a:txBody>
                   <a:tcPr/>
@@ -19431,6 +19821,40 @@
                     <a:bodyPr/>
                     <a:lstStyle/>
                     <a:p>
+                      <a:pPr marL="0" marR="0" lvl="0" indent="0" algn="ctr" defTabSz="914400" rtl="0" eaLnBrk="1" fontAlgn="auto" latinLnBrk="0" hangingPunct="1">
+                        <a:lnSpc>
+                          <a:spcPct val="100000"/>
+                        </a:lnSpc>
+                        <a:spcBef>
+                          <a:spcPts val="0"/>
+                        </a:spcBef>
+                        <a:spcAft>
+                          <a:spcPts val="0"/>
+                        </a:spcAft>
+                        <a:buClrTx/>
+                        <a:buSzTx/>
+                        <a:buFontTx/>
+                        <a:buNone/>
+                        <a:tabLst/>
+                        <a:defRPr/>
+                      </a:pPr>
+                      <a:r>
+                        <a:rPr lang="en-US" b="0" baseline="0" dirty="0"/>
+                        <a:t>Contrastive Method</a:t>
+                      </a:r>
+                    </a:p>
+                    <a:p>
+                      <a:pPr algn="ctr"/>
+                      <a:endParaRPr lang="en-IN" dirty="0"/>
+                    </a:p>
+                  </a:txBody>
+                  <a:tcPr/>
+                </a:tc>
+                <a:tc>
+                  <a:txBody>
+                    <a:bodyPr/>
+                    <a:lstStyle/>
+                    <a:p>
                       <a:pPr algn="ctr"/>
                       <a:r>
                         <a:rPr lang="en-US" b="1" dirty="0"/>
@@ -19457,13 +19881,6 @@
                       <a:r>
                         <a:rPr lang="en-US" b="1" baseline="0" dirty="0"/>
                         <a:t>Disadvantages</a:t>
-                      </a:r>
-                    </a:p>
-                    <a:p>
-                      <a:pPr algn="ctr"/>
-                      <a:r>
-                        <a:rPr lang="en-US" b="0" baseline="0" dirty="0"/>
-                        <a:t>Contrastive Method</a:t>
                       </a:r>
                     </a:p>
                     <a:p>
@@ -19576,6 +19993,40 @@
                     <a:bodyPr/>
                     <a:lstStyle/>
                     <a:p>
+                      <a:pPr marL="0" marR="0" lvl="0" indent="0" algn="ctr" defTabSz="914400" rtl="0" eaLnBrk="1" fontAlgn="auto" latinLnBrk="0" hangingPunct="1">
+                        <a:lnSpc>
+                          <a:spcPct val="100000"/>
+                        </a:lnSpc>
+                        <a:spcBef>
+                          <a:spcPts val="0"/>
+                        </a:spcBef>
+                        <a:spcAft>
+                          <a:spcPts val="0"/>
+                        </a:spcAft>
+                        <a:buClrTx/>
+                        <a:buSzTx/>
+                        <a:buFontTx/>
+                        <a:buNone/>
+                        <a:tabLst/>
+                        <a:defRPr/>
+                      </a:pPr>
+                      <a:r>
+                        <a:rPr lang="en-US" b="0" baseline="0" dirty="0"/>
+                        <a:t>Contrastive Method</a:t>
+                      </a:r>
+                    </a:p>
+                    <a:p>
+                      <a:pPr algn="ctr"/>
+                      <a:endParaRPr lang="en-US" baseline="0" dirty="0"/>
+                    </a:p>
+                  </a:txBody>
+                  <a:tcPr/>
+                </a:tc>
+                <a:tc>
+                  <a:txBody>
+                    <a:bodyPr/>
+                    <a:lstStyle/>
+                    <a:p>
                       <a:pPr algn="ctr"/>
                       <a:r>
                         <a:rPr lang="en-US" b="1" dirty="0"/>
@@ -19633,7 +20084,7 @@
 </p:sld>
 </file>
 
-<file path=ppt/slides/slide19.xml><?xml version="1.0" encoding="utf-8"?>
+<file path=ppt/slides/slide2.xml><?xml version="1.0" encoding="utf-8"?>
 <p:sld xmlns:a="http://schemas.openxmlformats.org/drawingml/2006/main" xmlns:r="http://schemas.openxmlformats.org/officeDocument/2006/relationships" xmlns:p="http://schemas.openxmlformats.org/presentationml/2006/main">
   <p:cSld>
     <p:spTree>
@@ -19652,6 +20103,179 @@
       </p:grpSpPr>
       <p:sp>
         <p:nvSpPr>
+          <p:cNvPr id="9" name="Title 8"/>
+          <p:cNvSpPr>
+            <a:spLocks noGrp="1"/>
+          </p:cNvSpPr>
+          <p:nvPr>
+            <p:ph type="title"/>
+          </p:nvPr>
+        </p:nvSpPr>
+        <p:spPr>
+          <a:xfrm>
+            <a:off x="826625" y="4867539"/>
+            <a:ext cx="2727803" cy="1025525"/>
+          </a:xfrm>
+        </p:spPr>
+        <p:txBody>
+          <a:bodyPr/>
+          <a:lstStyle/>
+          <a:p>
+            <a:r>
+              <a:rPr lang="en-US" dirty="0"/>
+              <a:t>Agenda</a:t>
+            </a:r>
+          </a:p>
+        </p:txBody>
+      </p:sp>
+      <p:sp>
+        <p:nvSpPr>
+          <p:cNvPr id="10" name="Text Placeholder 9"/>
+          <p:cNvSpPr>
+            <a:spLocks noGrp="1"/>
+          </p:cNvSpPr>
+          <p:nvPr>
+            <p:ph type="body" sz="quarter" idx="11"/>
+          </p:nvPr>
+        </p:nvSpPr>
+        <p:spPr/>
+        <p:txBody>
+          <a:bodyPr>
+            <a:normAutofit/>
+          </a:bodyPr>
+          <a:lstStyle/>
+          <a:p>
+            <a:r>
+              <a:rPr lang="en-US" sz="1800" dirty="0">
+                <a:effectLst/>
+                <a:latin typeface="Times New Roman" panose="02020603050405020304" pitchFamily="18" charset="0"/>
+                <a:ea typeface="Times New Roman" panose="02020603050405020304" pitchFamily="18" charset="0"/>
+              </a:rPr>
+              <a:t>Learning from limited labeled data for medical image analysis</a:t>
+            </a:r>
+            <a:endParaRPr lang="en-US" dirty="0"/>
+          </a:p>
+        </p:txBody>
+      </p:sp>
+      <p:sp>
+        <p:nvSpPr>
+          <p:cNvPr id="12" name="Text Placeholder 11"/>
+          <p:cNvSpPr>
+            <a:spLocks noGrp="1"/>
+          </p:cNvSpPr>
+          <p:nvPr>
+            <p:ph type="body" sz="quarter" idx="13"/>
+          </p:nvPr>
+        </p:nvSpPr>
+        <p:spPr>
+          <a:xfrm>
+            <a:off x="7559432" y="3190491"/>
+            <a:ext cx="4294206" cy="1034177"/>
+          </a:xfrm>
+        </p:spPr>
+        <p:txBody>
+          <a:bodyPr>
+            <a:noAutofit/>
+          </a:bodyPr>
+          <a:lstStyle/>
+          <a:p>
+            <a:r>
+              <a:rPr lang="en-US" sz="1800" dirty="0">
+                <a:latin typeface="Times New Roman" panose="02020603050405020304" pitchFamily="18" charset="0"/>
+                <a:cs typeface="Times New Roman" panose="02020603050405020304" pitchFamily="18" charset="0"/>
+              </a:rPr>
+              <a:t>Evaluate the performance of downstream classification tasks using ImageNet pretrained features obtained from supervised and self-supervised techniques</a:t>
+            </a:r>
+          </a:p>
+        </p:txBody>
+      </p:sp>
+      <p:pic>
+        <p:nvPicPr>
+          <p:cNvPr id="5" name="Picture Placeholder 4"/>
+          <p:cNvPicPr>
+            <a:picLocks noGrp="1" noChangeAspect="1"/>
+          </p:cNvPicPr>
+          <p:nvPr>
+            <p:ph type="pic" sz="quarter" idx="12"/>
+          </p:nvPr>
+        </p:nvPicPr>
+        <p:blipFill>
+          <a:blip r:embed="rId3"/>
+          <a:srcRect l="24540" r="24540"/>
+          <a:stretch>
+            <a:fillRect/>
+          </a:stretch>
+        </p:blipFill>
+        <p:spPr>
+          <a:xfrm>
+            <a:off x="3778137" y="2225041"/>
+            <a:ext cx="3557587" cy="3668024"/>
+          </a:xfrm>
+        </p:spPr>
+      </p:pic>
+      <p:sp>
+        <p:nvSpPr>
+          <p:cNvPr id="6" name="Text Placeholder 5"/>
+          <p:cNvSpPr>
+            <a:spLocks noGrp="1"/>
+          </p:cNvSpPr>
+          <p:nvPr>
+            <p:ph type="body" sz="quarter" idx="16"/>
+          </p:nvPr>
+        </p:nvSpPr>
+        <p:spPr>
+          <a:xfrm>
+            <a:off x="7559432" y="4604174"/>
+            <a:ext cx="4294206" cy="1192152"/>
+          </a:xfrm>
+        </p:spPr>
+        <p:txBody>
+          <a:bodyPr>
+            <a:noAutofit/>
+          </a:bodyPr>
+          <a:lstStyle/>
+          <a:p>
+            <a:r>
+              <a:rPr lang="en-US" sz="1800" dirty="0">
+                <a:latin typeface="Times New Roman" panose="02020603050405020304" pitchFamily="18" charset="0"/>
+                <a:cs typeface="Times New Roman" panose="02020603050405020304" pitchFamily="18" charset="0"/>
+              </a:rPr>
+              <a:t>Assess the quality of the embeddings obtained from different models which are pretrained on ImageNet using state-of-the-art self-supervised or supervised pretraining techniques.</a:t>
+            </a:r>
+            <a:endParaRPr lang="en-IN" sz="1800" dirty="0">
+              <a:latin typeface="Times New Roman" panose="02020603050405020304" pitchFamily="18" charset="0"/>
+              <a:cs typeface="Times New Roman" panose="02020603050405020304" pitchFamily="18" charset="0"/>
+            </a:endParaRPr>
+          </a:p>
+        </p:txBody>
+      </p:sp>
+    </p:spTree>
+  </p:cSld>
+  <p:clrMapOvr>
+    <a:masterClrMapping/>
+  </p:clrMapOvr>
+</p:sld>
+</file>
+
+<file path=ppt/slides/slide20.xml><?xml version="1.0" encoding="utf-8"?>
+<p:sld xmlns:a="http://schemas.openxmlformats.org/drawingml/2006/main" xmlns:r="http://schemas.openxmlformats.org/officeDocument/2006/relationships" xmlns:p="http://schemas.openxmlformats.org/presentationml/2006/main">
+  <p:cSld>
+    <p:spTree>
+      <p:nvGrpSpPr>
+        <p:cNvPr id="1" name=""/>
+        <p:cNvGrpSpPr/>
+        <p:nvPr/>
+      </p:nvGrpSpPr>
+      <p:grpSpPr>
+        <a:xfrm>
+          <a:off x="0" y="0"/>
+          <a:ext cx="0" cy="0"/>
+          <a:chOff x="0" y="0"/>
+          <a:chExt cx="0" cy="0"/>
+        </a:xfrm>
+      </p:grpSpPr>
+      <p:sp>
+        <p:nvSpPr>
           <p:cNvPr id="2" name="TextBox 1"/>
           <p:cNvSpPr txBox="1"/>
           <p:nvPr/>
@@ -19693,14 +20317,14 @@
           <p:nvPr>
             <p:extLst>
               <p:ext uri="{D42A27DB-BD31-4B8C-83A1-F6EECF244321}">
-                <p14:modId xmlns:p14="http://schemas.microsoft.com/office/powerpoint/2010/main" val="2379956789"/>
+                <p14:modId xmlns:p14="http://schemas.microsoft.com/office/powerpoint/2010/main" val="2952300518"/>
               </p:ext>
             </p:extLst>
           </p:nvPr>
         </p:nvGraphicFramePr>
         <p:xfrm>
           <a:off x="211014" y="924743"/>
-          <a:ext cx="11717129" cy="5727618"/>
+          <a:ext cx="11717129" cy="5894249"/>
         </p:xfrm>
         <a:graphic>
           <a:graphicData uri="http://schemas.openxmlformats.org/drawingml/2006/table">
@@ -19709,28 +20333,35 @@
                 <a:tableStyleId>{5C22544A-7EE6-4342-B048-85BDC9FD1C3A}</a:tableStyleId>
               </a:tblPr>
               <a:tblGrid>
-                <a:gridCol w="2866292">
+                <a:gridCol w="2302938">
                   <a:extLst>
                     <a:ext uri="{9D8B030D-6E8A-4147-A177-3AD203B41FA5}">
                       <a16:colId xmlns:a16="http://schemas.microsoft.com/office/drawing/2014/main" val="20000"/>
                     </a:ext>
                   </a:extLst>
                 </a:gridCol>
-                <a:gridCol w="2866292">
+                <a:gridCol w="2302938">
                   <a:extLst>
                     <a:ext uri="{9D8B030D-6E8A-4147-A177-3AD203B41FA5}">
                       <a16:colId xmlns:a16="http://schemas.microsoft.com/office/drawing/2014/main" val="20001"/>
                     </a:ext>
                   </a:extLst>
                 </a:gridCol>
-                <a:gridCol w="2866292">
+                <a:gridCol w="2302938">
                   <a:extLst>
                     <a:ext uri="{9D8B030D-6E8A-4147-A177-3AD203B41FA5}">
                       <a16:colId xmlns:a16="http://schemas.microsoft.com/office/drawing/2014/main" val="20002"/>
                     </a:ext>
                   </a:extLst>
                 </a:gridCol>
-                <a:gridCol w="3118253">
+                <a:gridCol w="2302938">
+                  <a:extLst>
+                    <a:ext uri="{9D8B030D-6E8A-4147-A177-3AD203B41FA5}">
+                      <a16:colId xmlns:a16="http://schemas.microsoft.com/office/drawing/2014/main" val="147974372"/>
+                    </a:ext>
+                  </a:extLst>
+                </a:gridCol>
+                <a:gridCol w="2505377">
                   <a:extLst>
                     <a:ext uri="{9D8B030D-6E8A-4147-A177-3AD203B41FA5}">
                       <a16:colId xmlns:a16="http://schemas.microsoft.com/office/drawing/2014/main" val="20003"/>
@@ -19738,7 +20369,7 @@
                   </a:extLst>
                 </a:gridCol>
               </a:tblGrid>
-              <a:tr h="640175">
+              <a:tr h="612919">
                 <a:tc>
                   <a:txBody>
                     <a:bodyPr/>
@@ -19791,6 +20422,20 @@
                     <a:p>
                       <a:pPr algn="ctr"/>
                       <a:r>
+                        <a:rPr lang="en-IN" dirty="0"/>
+                        <a:t>Method</a:t>
+                      </a:r>
+                    </a:p>
+                  </a:txBody>
+                  <a:tcPr/>
+                </a:tc>
+                <a:tc>
+                  <a:txBody>
+                    <a:bodyPr/>
+                    <a:lstStyle/>
+                    <a:p>
+                      <a:pPr algn="ctr"/>
+                      <a:r>
                         <a:rPr lang="en-US" dirty="0"/>
                         <a:t>Advantages</a:t>
                       </a:r>
@@ -19809,7 +20454,7 @@
                   </a:ext>
                 </a:extLst>
               </a:tr>
-              <a:tr h="2527123">
+              <a:tr h="2713953">
                 <a:tc>
                   <a:txBody>
                     <a:bodyPr/>
@@ -19863,6 +20508,40 @@
                     <a:bodyPr/>
                     <a:lstStyle/>
                     <a:p>
+                      <a:pPr marL="0" marR="0" lvl="0" indent="0" algn="ctr" defTabSz="914400" rtl="0" eaLnBrk="1" fontAlgn="auto" latinLnBrk="0" hangingPunct="1">
+                        <a:lnSpc>
+                          <a:spcPct val="100000"/>
+                        </a:lnSpc>
+                        <a:spcBef>
+                          <a:spcPts val="0"/>
+                        </a:spcBef>
+                        <a:spcAft>
+                          <a:spcPts val="0"/>
+                        </a:spcAft>
+                        <a:buClrTx/>
+                        <a:buSzTx/>
+                        <a:buFontTx/>
+                        <a:buNone/>
+                        <a:tabLst/>
+                        <a:defRPr/>
+                      </a:pPr>
+                      <a:r>
+                        <a:rPr lang="en-US" b="0" baseline="0" dirty="0"/>
+                        <a:t>Contrastive Method</a:t>
+                      </a:r>
+                    </a:p>
+                    <a:p>
+                      <a:pPr algn="ctr"/>
+                      <a:endParaRPr lang="en-IN" dirty="0"/>
+                    </a:p>
+                  </a:txBody>
+                  <a:tcPr/>
+                </a:tc>
+                <a:tc>
+                  <a:txBody>
+                    <a:bodyPr/>
+                    <a:lstStyle/>
+                    <a:p>
                       <a:pPr algn="ctr"/>
                       <a:r>
                         <a:rPr lang="en-US" b="1" dirty="0"/>
@@ -19891,13 +20570,6 @@
                       <a:pPr algn="ctr"/>
                       <a:r>
                         <a:rPr lang="en-US" b="0" baseline="0" dirty="0"/>
-                        <a:t>Contrastive Method</a:t>
-                      </a:r>
-                    </a:p>
-                    <a:p>
-                      <a:pPr algn="ctr"/>
-                      <a:r>
-                        <a:rPr lang="en-US" b="0" baseline="0" dirty="0"/>
                         <a:t>Needs more negative Samples and more memory</a:t>
                       </a:r>
                       <a:endParaRPr lang="en-US" b="0" dirty="0"/>
@@ -19915,7 +20587,7 @@
                   </a:ext>
                 </a:extLst>
               </a:tr>
-              <a:tr h="2527123">
+              <a:tr h="2419529">
                 <a:tc>
                   <a:txBody>
                     <a:bodyPr/>
@@ -19974,17 +20646,44 @@
                     <a:bodyPr/>
                     <a:lstStyle/>
                     <a:p>
+                      <a:pPr marL="0" marR="0" lvl="0" indent="0" algn="ctr" defTabSz="914400" rtl="0" eaLnBrk="1" fontAlgn="auto" latinLnBrk="0" hangingPunct="1">
+                        <a:lnSpc>
+                          <a:spcPct val="100000"/>
+                        </a:lnSpc>
+                        <a:spcBef>
+                          <a:spcPts val="0"/>
+                        </a:spcBef>
+                        <a:spcAft>
+                          <a:spcPts val="0"/>
+                        </a:spcAft>
+                        <a:buClrTx/>
+                        <a:buSzTx/>
+                        <a:buFontTx/>
+                        <a:buNone/>
+                        <a:tabLst/>
+                        <a:defRPr/>
+                      </a:pPr>
+                      <a:r>
+                        <a:rPr lang="en-US" b="0" baseline="0" dirty="0"/>
+                        <a:t>Non Contrastive Method</a:t>
+                      </a:r>
+                    </a:p>
+                    <a:p>
+                      <a:pPr algn="ctr"/>
+                      <a:endParaRPr lang="en-US" baseline="0" dirty="0"/>
+                    </a:p>
+                  </a:txBody>
+                  <a:tcPr/>
+                </a:tc>
+                <a:tc>
+                  <a:txBody>
+                    <a:bodyPr/>
+                    <a:lstStyle/>
+                    <a:p>
                       <a:pPr algn="ctr"/>
                       <a:r>
                         <a:rPr lang="en-US" b="1" dirty="0"/>
                         <a:t>Advantages</a:t>
-                      </a:r>
-                    </a:p>
-                    <a:p>
-                      <a:pPr algn="ctr"/>
-                      <a:r>
-                        <a:rPr lang="en-US" b="0" baseline="0" dirty="0"/>
-                        <a:t>Non Contrastive Method</a:t>
                       </a:r>
                     </a:p>
                     <a:p>
@@ -20034,261 +20733,6 @@
 </p:sld>
 </file>
 
-<file path=ppt/slides/slide2.xml><?xml version="1.0" encoding="utf-8"?>
-<p:sld xmlns:a="http://schemas.openxmlformats.org/drawingml/2006/main" xmlns:r="http://schemas.openxmlformats.org/officeDocument/2006/relationships" xmlns:p="http://schemas.openxmlformats.org/presentationml/2006/main">
-  <p:cSld>
-    <p:spTree>
-      <p:nvGrpSpPr>
-        <p:cNvPr id="1" name=""/>
-        <p:cNvGrpSpPr/>
-        <p:nvPr/>
-      </p:nvGrpSpPr>
-      <p:grpSpPr>
-        <a:xfrm>
-          <a:off x="0" y="0"/>
-          <a:ext cx="0" cy="0"/>
-          <a:chOff x="0" y="0"/>
-          <a:chExt cx="0" cy="0"/>
-        </a:xfrm>
-      </p:grpSpPr>
-      <p:sp>
-        <p:nvSpPr>
-          <p:cNvPr id="9" name="Title 8"/>
-          <p:cNvSpPr>
-            <a:spLocks noGrp="1"/>
-          </p:cNvSpPr>
-          <p:nvPr>
-            <p:ph type="title"/>
-          </p:nvPr>
-        </p:nvSpPr>
-        <p:spPr>
-          <a:xfrm>
-            <a:off x="826625" y="4867539"/>
-            <a:ext cx="2727803" cy="1025525"/>
-          </a:xfrm>
-        </p:spPr>
-        <p:txBody>
-          <a:bodyPr/>
-          <a:lstStyle/>
-          <a:p>
-            <a:r>
-              <a:rPr lang="en-US" dirty="0"/>
-              <a:t>Agenda</a:t>
-            </a:r>
-          </a:p>
-        </p:txBody>
-      </p:sp>
-      <p:sp>
-        <p:nvSpPr>
-          <p:cNvPr id="10" name="Text Placeholder 9"/>
-          <p:cNvSpPr>
-            <a:spLocks noGrp="1"/>
-          </p:cNvSpPr>
-          <p:nvPr>
-            <p:ph type="body" sz="quarter" idx="11"/>
-          </p:nvPr>
-        </p:nvSpPr>
-        <p:spPr/>
-        <p:txBody>
-          <a:bodyPr>
-            <a:normAutofit/>
-          </a:bodyPr>
-          <a:lstStyle/>
-          <a:p>
-            <a:r>
-              <a:rPr lang="en-US" sz="1800" dirty="0">
-                <a:effectLst/>
-                <a:latin typeface="Times New Roman" panose="02020603050405020304" pitchFamily="18" charset="0"/>
-                <a:ea typeface="Times New Roman" panose="02020603050405020304" pitchFamily="18" charset="0"/>
-              </a:rPr>
-              <a:t>Learning from limited labeled data for medical image analysis</a:t>
-            </a:r>
-            <a:endParaRPr lang="en-US" dirty="0"/>
-          </a:p>
-        </p:txBody>
-      </p:sp>
-      <p:sp>
-        <p:nvSpPr>
-          <p:cNvPr id="12" name="Text Placeholder 11"/>
-          <p:cNvSpPr>
-            <a:spLocks noGrp="1"/>
-          </p:cNvSpPr>
-          <p:nvPr>
-            <p:ph type="body" sz="quarter" idx="13"/>
-          </p:nvPr>
-        </p:nvSpPr>
-        <p:spPr>
-          <a:xfrm>
-            <a:off x="7559432" y="3190491"/>
-            <a:ext cx="4294206" cy="1034177"/>
-          </a:xfrm>
-        </p:spPr>
-        <p:txBody>
-          <a:bodyPr>
-            <a:noAutofit/>
-          </a:bodyPr>
-          <a:lstStyle/>
-          <a:p>
-            <a:r>
-              <a:rPr lang="en-US" sz="1800" dirty="0">
-                <a:latin typeface="Times New Roman" panose="02020603050405020304" pitchFamily="18" charset="0"/>
-                <a:cs typeface="Times New Roman" panose="02020603050405020304" pitchFamily="18" charset="0"/>
-              </a:rPr>
-              <a:t>Evaluate the performance of downstream classification tasks using ImageNet pretrained features obtained from supervised and self-supervised techniques</a:t>
-            </a:r>
-          </a:p>
-        </p:txBody>
-      </p:sp>
-      <p:pic>
-        <p:nvPicPr>
-          <p:cNvPr id="5" name="Picture Placeholder 4"/>
-          <p:cNvPicPr>
-            <a:picLocks noGrp="1" noChangeAspect="1"/>
-          </p:cNvPicPr>
-          <p:nvPr>
-            <p:ph type="pic" sz="quarter" idx="12"/>
-          </p:nvPr>
-        </p:nvPicPr>
-        <p:blipFill>
-          <a:blip r:embed="rId3"/>
-          <a:srcRect l="24540" r="24540"/>
-          <a:stretch>
-            <a:fillRect/>
-          </a:stretch>
-        </p:blipFill>
-        <p:spPr>
-          <a:xfrm>
-            <a:off x="3778137" y="2225041"/>
-            <a:ext cx="3557587" cy="3668024"/>
-          </a:xfrm>
-        </p:spPr>
-      </p:pic>
-      <p:sp>
-        <p:nvSpPr>
-          <p:cNvPr id="6" name="Text Placeholder 5"/>
-          <p:cNvSpPr>
-            <a:spLocks noGrp="1"/>
-          </p:cNvSpPr>
-          <p:nvPr>
-            <p:ph type="body" sz="quarter" idx="16"/>
-          </p:nvPr>
-        </p:nvSpPr>
-        <p:spPr>
-          <a:xfrm>
-            <a:off x="7559432" y="4604174"/>
-            <a:ext cx="4294206" cy="1192152"/>
-          </a:xfrm>
-        </p:spPr>
-        <p:txBody>
-          <a:bodyPr>
-            <a:noAutofit/>
-          </a:bodyPr>
-          <a:lstStyle/>
-          <a:p>
-            <a:r>
-              <a:rPr lang="en-US" sz="1800" dirty="0">
-                <a:latin typeface="Times New Roman" panose="02020603050405020304" pitchFamily="18" charset="0"/>
-                <a:cs typeface="Times New Roman" panose="02020603050405020304" pitchFamily="18" charset="0"/>
-              </a:rPr>
-              <a:t>Assess the quality of the embeddings obtained from different models which are pretrained on ImageNet using state-of-the-art self-supervised or supervised pretraining techniques.</a:t>
-            </a:r>
-            <a:endParaRPr lang="en-IN" sz="1800" dirty="0">
-              <a:latin typeface="Times New Roman" panose="02020603050405020304" pitchFamily="18" charset="0"/>
-              <a:cs typeface="Times New Roman" panose="02020603050405020304" pitchFamily="18" charset="0"/>
-            </a:endParaRPr>
-          </a:p>
-        </p:txBody>
-      </p:sp>
-    </p:spTree>
-  </p:cSld>
-  <p:clrMapOvr>
-    <a:masterClrMapping/>
-  </p:clrMapOvr>
-</p:sld>
-</file>
-
-<file path=ppt/slides/slide20.xml><?xml version="1.0" encoding="utf-8"?>
-<p:sld xmlns:a="http://schemas.openxmlformats.org/drawingml/2006/main" xmlns:r="http://schemas.openxmlformats.org/officeDocument/2006/relationships" xmlns:p="http://schemas.openxmlformats.org/presentationml/2006/main">
-  <p:cSld>
-    <p:spTree>
-      <p:nvGrpSpPr>
-        <p:cNvPr id="1" name=""/>
-        <p:cNvGrpSpPr/>
-        <p:nvPr/>
-      </p:nvGrpSpPr>
-      <p:grpSpPr>
-        <a:xfrm>
-          <a:off x="0" y="0"/>
-          <a:ext cx="0" cy="0"/>
-          <a:chOff x="0" y="0"/>
-          <a:chExt cx="0" cy="0"/>
-        </a:xfrm>
-      </p:grpSpPr>
-      <p:sp>
-        <p:nvSpPr>
-          <p:cNvPr id="2" name="Picture Placeholder 1"/>
-          <p:cNvSpPr>
-            <a:spLocks noGrp="1"/>
-          </p:cNvSpPr>
-          <p:nvPr>
-            <p:ph type="pic" sz="quarter" idx="15"/>
-          </p:nvPr>
-        </p:nvSpPr>
-        <p:spPr/>
-      </p:sp>
-      <p:sp>
-        <p:nvSpPr>
-          <p:cNvPr id="3" name="Title 2"/>
-          <p:cNvSpPr>
-            <a:spLocks noGrp="1"/>
-          </p:cNvSpPr>
-          <p:nvPr>
-            <p:ph type="title"/>
-          </p:nvPr>
-        </p:nvSpPr>
-        <p:spPr/>
-        <p:txBody>
-          <a:bodyPr/>
-          <a:lstStyle/>
-          <a:p>
-            <a:r>
-              <a:rPr lang="en-US"/>
-              <a:t>UML Diagrams</a:t>
-            </a:r>
-            <a:br>
-              <a:rPr lang="en-US"/>
-            </a:br>
-            <a:endParaRPr lang="en-US"/>
-          </a:p>
-        </p:txBody>
-      </p:sp>
-      <p:sp>
-        <p:nvSpPr>
-          <p:cNvPr id="4" name="Text Placeholder 3"/>
-          <p:cNvSpPr>
-            <a:spLocks noGrp="1"/>
-          </p:cNvSpPr>
-          <p:nvPr>
-            <p:ph type="body" sz="quarter" idx="14"/>
-          </p:nvPr>
-        </p:nvSpPr>
-        <p:spPr/>
-        <p:txBody>
-          <a:bodyPr/>
-          <a:lstStyle/>
-          <a:p>
-            <a:endParaRPr lang="en-US"/>
-          </a:p>
-        </p:txBody>
-      </p:sp>
-    </p:spTree>
-  </p:cSld>
-  <p:clrMapOvr>
-    <a:masterClrMapping/>
-  </p:clrMapOvr>
-</p:sld>
-</file>
-
 <file path=ppt/slides/slide21.xml><?xml version="1.0" encoding="utf-8"?>
 <p:sld xmlns:a="http://schemas.openxmlformats.org/drawingml/2006/main" xmlns:r="http://schemas.openxmlformats.org/officeDocument/2006/relationships" xmlns:p="http://schemas.openxmlformats.org/presentationml/2006/main">
   <p:cSld>
@@ -20308,7 +20752,19 @@
       </p:grpSpPr>
       <p:sp>
         <p:nvSpPr>
-          <p:cNvPr id="8" name="Title 7"/>
+          <p:cNvPr id="2" name="Picture Placeholder 1"/>
+          <p:cNvSpPr>
+            <a:spLocks noGrp="1"/>
+          </p:cNvSpPr>
+          <p:nvPr>
+            <p:ph type="pic" sz="quarter" idx="15"/>
+          </p:nvPr>
+        </p:nvSpPr>
+        <p:spPr/>
+      </p:sp>
+      <p:sp>
+        <p:nvSpPr>
+          <p:cNvPr id="3" name="Title 2"/>
           <p:cNvSpPr>
             <a:spLocks noGrp="1"/>
           </p:cNvSpPr>
@@ -20316,51 +20772,41 @@
             <p:ph type="title"/>
           </p:nvPr>
         </p:nvSpPr>
-        <p:spPr>
-          <a:xfrm>
-            <a:off x="711200" y="414655"/>
-            <a:ext cx="4766945" cy="1125855"/>
-          </a:xfrm>
-        </p:spPr>
+        <p:spPr/>
         <p:txBody>
           <a:bodyPr/>
           <a:lstStyle/>
           <a:p>
             <a:r>
-              <a:rPr lang="en-US" dirty="0">
-                <a:solidFill>
-                  <a:srgbClr val="5DAAB0"/>
-                </a:solidFill>
-              </a:rPr>
-              <a:t>Use Case Diagram</a:t>
-            </a:r>
-          </a:p>
-        </p:txBody>
-      </p:sp>
-      <p:pic>
-        <p:nvPicPr>
-          <p:cNvPr id="5" name="Picture 4" descr="use case diagram mini"/>
-          <p:cNvPicPr>
-            <a:picLocks noChangeAspect="1"/>
-          </p:cNvPicPr>
-          <p:nvPr/>
-        </p:nvPicPr>
-        <p:blipFill>
-          <a:blip r:embed="rId3"/>
-          <a:stretch>
-            <a:fillRect/>
-          </a:stretch>
-        </p:blipFill>
-        <p:spPr>
-          <a:xfrm>
-            <a:off x="4431030" y="1540510"/>
-            <a:ext cx="7029450" cy="5038725"/>
-          </a:xfrm>
-          <a:prstGeom prst="rect">
-            <a:avLst/>
-          </a:prstGeom>
-        </p:spPr>
-      </p:pic>
+              <a:rPr lang="en-US"/>
+              <a:t>UML Diagrams</a:t>
+            </a:r>
+            <a:br>
+              <a:rPr lang="en-US"/>
+            </a:br>
+            <a:endParaRPr lang="en-US"/>
+          </a:p>
+        </p:txBody>
+      </p:sp>
+      <p:sp>
+        <p:nvSpPr>
+          <p:cNvPr id="4" name="Text Placeholder 3"/>
+          <p:cNvSpPr>
+            <a:spLocks noGrp="1"/>
+          </p:cNvSpPr>
+          <p:nvPr>
+            <p:ph type="body" sz="quarter" idx="14"/>
+          </p:nvPr>
+        </p:nvSpPr>
+        <p:spPr/>
+        <p:txBody>
+          <a:bodyPr/>
+          <a:lstStyle/>
+          <a:p>
+            <a:endParaRPr lang="en-US"/>
+          </a:p>
+        </p:txBody>
+      </p:sp>
     </p:spTree>
   </p:cSld>
   <p:clrMapOvr>
@@ -20403,9 +20849,7 @@
           </a:xfrm>
         </p:spPr>
         <p:txBody>
-          <a:bodyPr>
-            <a:normAutofit/>
-          </a:bodyPr>
+          <a:bodyPr/>
           <a:lstStyle/>
           <a:p>
             <a:r>
@@ -20414,14 +20858,14 @@
                   <a:srgbClr val="5DAAB0"/>
                 </a:solidFill>
               </a:rPr>
-              <a:t>Data Flow Diagram</a:t>
+              <a:t>Use Case Diagram</a:t>
             </a:r>
           </a:p>
         </p:txBody>
       </p:sp>
       <p:pic>
         <p:nvPicPr>
-          <p:cNvPr id="2" name="Picture 1" descr="DFDDiagram1"/>
+          <p:cNvPr id="5" name="Picture 4" descr="use case diagram mini"/>
           <p:cNvPicPr>
             <a:picLocks noChangeAspect="1"/>
           </p:cNvPicPr>
@@ -20435,8 +20879,8 @@
         </p:blipFill>
         <p:spPr>
           <a:xfrm>
-            <a:off x="5837555" y="931232"/>
-            <a:ext cx="5419725" cy="5191125"/>
+            <a:off x="4431030" y="1540510"/>
+            <a:ext cx="7029450" cy="5038725"/>
           </a:xfrm>
           <a:prstGeom prst="rect">
             <a:avLst/>
@@ -20485,7 +20929,9 @@
           </a:xfrm>
         </p:spPr>
         <p:txBody>
-          <a:bodyPr/>
+          <a:bodyPr>
+            <a:normAutofit/>
+          </a:bodyPr>
           <a:lstStyle/>
           <a:p>
             <a:r>
@@ -20494,14 +20940,14 @@
                   <a:srgbClr val="5DAAB0"/>
                 </a:solidFill>
               </a:rPr>
-              <a:t>Sequence Diagram</a:t>
+              <a:t>Data Flow Diagram</a:t>
             </a:r>
           </a:p>
         </p:txBody>
       </p:sp>
       <p:pic>
         <p:nvPicPr>
-          <p:cNvPr id="3" name="Picture 2" descr="SequenceDiagram1"/>
+          <p:cNvPr id="2" name="Picture 1" descr="DFDDiagram1"/>
           <p:cNvPicPr>
             <a:picLocks noChangeAspect="1"/>
           </p:cNvPicPr>
@@ -20515,8 +20961,8 @@
         </p:blipFill>
         <p:spPr>
           <a:xfrm>
-            <a:off x="5699125" y="1442720"/>
-            <a:ext cx="5670550" cy="4905375"/>
+            <a:off x="5837555" y="931232"/>
+            <a:ext cx="5419725" cy="5191125"/>
           </a:xfrm>
           <a:prstGeom prst="rect">
             <a:avLst/>
@@ -20550,31 +20996,7 @@
       </p:grpSpPr>
       <p:sp>
         <p:nvSpPr>
-          <p:cNvPr id="2" name="Picture Placeholder 1">
-            <a:extLst>
-              <a:ext uri="{FF2B5EF4-FFF2-40B4-BE49-F238E27FC236}">
-                <a16:creationId xmlns:a16="http://schemas.microsoft.com/office/drawing/2014/main" id="{B4D52236-9CBD-EF89-236B-0C94F53F75A5}"/>
-              </a:ext>
-            </a:extLst>
-          </p:cNvPr>
-          <p:cNvSpPr>
-            <a:spLocks noGrp="1"/>
-          </p:cNvSpPr>
-          <p:nvPr>
-            <p:ph type="pic" sz="quarter" idx="15"/>
-          </p:nvPr>
-        </p:nvSpPr>
-        <p:spPr/>
-      </p:sp>
-      <p:sp>
-        <p:nvSpPr>
-          <p:cNvPr id="3" name="Title 2">
-            <a:extLst>
-              <a:ext uri="{FF2B5EF4-FFF2-40B4-BE49-F238E27FC236}">
-                <a16:creationId xmlns:a16="http://schemas.microsoft.com/office/drawing/2014/main" id="{A07B76F4-BCFE-6E4F-404F-801C2856028F}"/>
-              </a:ext>
-            </a:extLst>
-          </p:cNvPr>
+          <p:cNvPr id="8" name="Title 7"/>
           <p:cNvSpPr>
             <a:spLocks noGrp="1"/>
           </p:cNvSpPr>
@@ -20582,49 +21004,52 @@
             <p:ph type="title"/>
           </p:nvPr>
         </p:nvSpPr>
-        <p:spPr/>
+        <p:spPr>
+          <a:xfrm>
+            <a:off x="711200" y="414655"/>
+            <a:ext cx="4766945" cy="1125855"/>
+          </a:xfrm>
+        </p:spPr>
         <p:txBody>
           <a:bodyPr/>
           <a:lstStyle/>
           <a:p>
             <a:r>
-              <a:rPr lang="en-IN" dirty="0"/>
-              <a:t>Results</a:t>
-            </a:r>
-          </a:p>
-        </p:txBody>
-      </p:sp>
-      <p:sp>
-        <p:nvSpPr>
-          <p:cNvPr id="4" name="Text Placeholder 3">
-            <a:extLst>
-              <a:ext uri="{FF2B5EF4-FFF2-40B4-BE49-F238E27FC236}">
-                <a16:creationId xmlns:a16="http://schemas.microsoft.com/office/drawing/2014/main" id="{D1796270-E069-51BC-8C85-47DEC707A66C}"/>
-              </a:ext>
-            </a:extLst>
-          </p:cNvPr>
-          <p:cNvSpPr>
-            <a:spLocks noGrp="1"/>
-          </p:cNvSpPr>
-          <p:nvPr>
-            <p:ph type="body" sz="quarter" idx="14"/>
-          </p:nvPr>
-        </p:nvSpPr>
-        <p:spPr/>
-        <p:txBody>
-          <a:bodyPr/>
-          <a:lstStyle/>
-          <a:p>
-            <a:endParaRPr lang="en-IN"/>
-          </a:p>
-        </p:txBody>
-      </p:sp>
+              <a:rPr lang="en-US" dirty="0">
+                <a:solidFill>
+                  <a:srgbClr val="5DAAB0"/>
+                </a:solidFill>
+              </a:rPr>
+              <a:t>Sequence Diagram</a:t>
+            </a:r>
+          </a:p>
+        </p:txBody>
+      </p:sp>
+      <p:pic>
+        <p:nvPicPr>
+          <p:cNvPr id="3" name="Picture 2" descr="SequenceDiagram1"/>
+          <p:cNvPicPr>
+            <a:picLocks noChangeAspect="1"/>
+          </p:cNvPicPr>
+          <p:nvPr/>
+        </p:nvPicPr>
+        <p:blipFill>
+          <a:blip r:embed="rId3"/>
+          <a:stretch>
+            <a:fillRect/>
+          </a:stretch>
+        </p:blipFill>
+        <p:spPr>
+          <a:xfrm>
+            <a:off x="5699125" y="1442720"/>
+            <a:ext cx="5670550" cy="4905375"/>
+          </a:xfrm>
+          <a:prstGeom prst="rect">
+            <a:avLst/>
+          </a:prstGeom>
+        </p:spPr>
+      </p:pic>
     </p:spTree>
-    <p:extLst>
-      <p:ext uri="{BB962C8B-B14F-4D97-AF65-F5344CB8AC3E}">
-        <p14:creationId xmlns:p14="http://schemas.microsoft.com/office/powerpoint/2010/main" val="3874288758"/>
-      </p:ext>
-    </p:extLst>
   </p:cSld>
   <p:clrMapOvr>
     <a:masterClrMapping/>
@@ -20651,184 +21076,79 @@
       </p:grpSpPr>
       <p:sp>
         <p:nvSpPr>
-          <p:cNvPr id="8" name="Title 7"/>
-          <p:cNvSpPr>
-            <a:spLocks noGrp="1"/>
-          </p:cNvSpPr>
-          <p:nvPr>
-            <p:ph type="title"/>
-          </p:nvPr>
-        </p:nvSpPr>
-        <p:spPr>
-          <a:xfrm>
-            <a:off x="157527" y="182827"/>
-            <a:ext cx="7213331" cy="654675"/>
-          </a:xfrm>
-        </p:spPr>
-        <p:txBody>
-          <a:bodyPr>
-            <a:normAutofit/>
-          </a:bodyPr>
-          <a:lstStyle/>
-          <a:p>
-            <a:r>
-              <a:rPr lang="en-US" dirty="0">
-                <a:solidFill>
-                  <a:srgbClr val="5DAAB0"/>
-                </a:solidFill>
-              </a:rPr>
-              <a:t>Experiments</a:t>
-            </a:r>
-          </a:p>
-        </p:txBody>
-      </p:sp>
-      <p:sp>
-        <p:nvSpPr>
-          <p:cNvPr id="2" name="TextBox 1">
+          <p:cNvPr id="2" name="Picture Placeholder 1">
             <a:extLst>
               <a:ext uri="{FF2B5EF4-FFF2-40B4-BE49-F238E27FC236}">
-                <a16:creationId xmlns:a16="http://schemas.microsoft.com/office/drawing/2014/main" id="{A7C8A4B5-A7AA-439C-AD3B-0B6F098CB38A}"/>
+                <a16:creationId xmlns:a16="http://schemas.microsoft.com/office/drawing/2014/main" id="{B4D52236-9CBD-EF89-236B-0C94F53F75A5}"/>
               </a:ext>
             </a:extLst>
           </p:cNvPr>
-          <p:cNvSpPr txBox="1"/>
-          <p:nvPr/>
-        </p:nvSpPr>
-        <p:spPr>
-          <a:xfrm>
-            <a:off x="445273" y="1144988"/>
-            <a:ext cx="6106602" cy="4247317"/>
-          </a:xfrm>
-          <a:prstGeom prst="rect">
-            <a:avLst/>
-          </a:prstGeom>
-          <a:noFill/>
-        </p:spPr>
-        <p:txBody>
-          <a:bodyPr wrap="square" rtlCol="0">
-            <a:spAutoFit/>
-          </a:bodyPr>
-          <a:lstStyle/>
-          <a:p>
-            <a:r>
-              <a:rPr lang="en-IN" dirty="0"/>
-              <a:t>We performed the above shown techniques on 2 diabetic retinopathy datasets</a:t>
-            </a:r>
-          </a:p>
-          <a:p>
-            <a:endParaRPr lang="en-IN" dirty="0"/>
-          </a:p>
-          <a:p>
-            <a:pPr marL="342900" indent="-342900">
-              <a:buAutoNum type="arabicPeriod"/>
-            </a:pPr>
-            <a:r>
-              <a:rPr lang="en-IN" dirty="0"/>
-              <a:t>Aptos (contains 3k images)</a:t>
-            </a:r>
-          </a:p>
-          <a:p>
-            <a:pPr marL="342900" indent="-342900">
-              <a:buAutoNum type="arabicPeriod"/>
-            </a:pPr>
-            <a:r>
-              <a:rPr lang="en-IN" dirty="0" err="1"/>
-              <a:t>Eyepacs</a:t>
-            </a:r>
-            <a:r>
-              <a:rPr lang="en-IN" dirty="0"/>
-              <a:t> (contains 30k images)</a:t>
-            </a:r>
-          </a:p>
-          <a:p>
-            <a:pPr marL="342900" indent="-342900">
-              <a:buAutoNum type="arabicPeriod"/>
-            </a:pPr>
-            <a:endParaRPr lang="en-IN" dirty="0"/>
-          </a:p>
-          <a:p>
-            <a:pPr marL="342900" indent="-342900">
-              <a:buAutoNum type="arabicPeriod"/>
-            </a:pPr>
-            <a:endParaRPr lang="en-IN" dirty="0"/>
-          </a:p>
-          <a:p>
-            <a:r>
-              <a:rPr lang="en-IN" dirty="0"/>
-              <a:t>We first train the model with </a:t>
-            </a:r>
-            <a:r>
-              <a:rPr lang="en-IN" dirty="0" err="1"/>
-              <a:t>imagenet</a:t>
-            </a:r>
-            <a:r>
-              <a:rPr lang="en-IN" dirty="0"/>
-              <a:t> initialization on the datasets and then finetune to get the maximum accuracy for the given problem</a:t>
-            </a:r>
-          </a:p>
-          <a:p>
-            <a:endParaRPr lang="en-IN" dirty="0"/>
-          </a:p>
-          <a:p>
-            <a:r>
-              <a:rPr lang="en-IN" dirty="0"/>
-              <a:t>And comparing the accuracy to supervised techniques</a:t>
-            </a:r>
-          </a:p>
-          <a:p>
-            <a:endParaRPr lang="en-IN" dirty="0"/>
-          </a:p>
-          <a:p>
-            <a:r>
-              <a:rPr lang="en-IN" dirty="0"/>
-              <a:t>Using </a:t>
-            </a:r>
-            <a:r>
-              <a:rPr lang="en-IN" dirty="0" err="1"/>
-              <a:t>Eyepacs</a:t>
-            </a:r>
-            <a:r>
-              <a:rPr lang="en-IN" dirty="0"/>
-              <a:t> (30k images) also shows how easily it is scalable to more data</a:t>
-            </a:r>
-          </a:p>
-        </p:txBody>
-      </p:sp>
-      <p:pic>
-        <p:nvPicPr>
-          <p:cNvPr id="3" name="Picture Placeholder 4">
+          <p:cNvSpPr>
+            <a:spLocks noGrp="1"/>
+          </p:cNvSpPr>
+          <p:nvPr>
+            <p:ph type="pic" sz="quarter" idx="15"/>
+          </p:nvPr>
+        </p:nvSpPr>
+        <p:spPr/>
+      </p:sp>
+      <p:sp>
+        <p:nvSpPr>
+          <p:cNvPr id="3" name="Title 2">
             <a:extLst>
               <a:ext uri="{FF2B5EF4-FFF2-40B4-BE49-F238E27FC236}">
-                <a16:creationId xmlns:a16="http://schemas.microsoft.com/office/drawing/2014/main" id="{7CBF12F9-5AAC-DC94-F4FC-EF379F56B554}"/>
+                <a16:creationId xmlns:a16="http://schemas.microsoft.com/office/drawing/2014/main" id="{A07B76F4-BCFE-6E4F-404F-801C2856028F}"/>
               </a:ext>
             </a:extLst>
           </p:cNvPr>
-          <p:cNvPicPr>
-            <a:picLocks noChangeAspect="1"/>
-          </p:cNvPicPr>
-          <p:nvPr/>
-        </p:nvPicPr>
-        <p:blipFill>
-          <a:blip r:embed="rId3"/>
-          <a:srcRect l="24540" r="24540"/>
-          <a:stretch>
-            <a:fillRect/>
-          </a:stretch>
-        </p:blipFill>
-        <p:spPr>
-          <a:xfrm>
-            <a:off x="7044856" y="-87464"/>
-            <a:ext cx="5147144" cy="6858000"/>
-          </a:xfrm>
-          <a:prstGeom prst="rect">
-            <a:avLst/>
-          </a:prstGeom>
-        </p:spPr>
-      </p:pic>
+          <p:cNvSpPr>
+            <a:spLocks noGrp="1"/>
+          </p:cNvSpPr>
+          <p:nvPr>
+            <p:ph type="title"/>
+          </p:nvPr>
+        </p:nvSpPr>
+        <p:spPr/>
+        <p:txBody>
+          <a:bodyPr/>
+          <a:lstStyle/>
+          <a:p>
+            <a:r>
+              <a:rPr lang="en-IN" dirty="0"/>
+              <a:t>Results</a:t>
+            </a:r>
+          </a:p>
+        </p:txBody>
+      </p:sp>
+      <p:sp>
+        <p:nvSpPr>
+          <p:cNvPr id="4" name="Text Placeholder 3">
+            <a:extLst>
+              <a:ext uri="{FF2B5EF4-FFF2-40B4-BE49-F238E27FC236}">
+                <a16:creationId xmlns:a16="http://schemas.microsoft.com/office/drawing/2014/main" id="{D1796270-E069-51BC-8C85-47DEC707A66C}"/>
+              </a:ext>
+            </a:extLst>
+          </p:cNvPr>
+          <p:cNvSpPr>
+            <a:spLocks noGrp="1"/>
+          </p:cNvSpPr>
+          <p:nvPr>
+            <p:ph type="body" sz="quarter" idx="14"/>
+          </p:nvPr>
+        </p:nvSpPr>
+        <p:spPr/>
+        <p:txBody>
+          <a:bodyPr/>
+          <a:lstStyle/>
+          <a:p>
+            <a:endParaRPr lang="en-IN"/>
+          </a:p>
+        </p:txBody>
+      </p:sp>
     </p:spTree>
     <p:extLst>
       <p:ext uri="{BB962C8B-B14F-4D97-AF65-F5344CB8AC3E}">
-        <p14:creationId xmlns:p14="http://schemas.microsoft.com/office/powerpoint/2010/main" val="2160295084"/>
+        <p14:creationId xmlns:p14="http://schemas.microsoft.com/office/powerpoint/2010/main" val="3874288758"/>
       </p:ext>
     </p:extLst>
   </p:cSld>
@@ -20883,17 +21203,129 @@
                   <a:srgbClr val="5DAAB0"/>
                 </a:solidFill>
               </a:rPr>
-              <a:t>Aptos</a:t>
+              <a:t>Experiments</a:t>
+            </a:r>
+          </a:p>
+        </p:txBody>
+      </p:sp>
+      <p:sp>
+        <p:nvSpPr>
+          <p:cNvPr id="2" name="TextBox 1">
+            <a:extLst>
+              <a:ext uri="{FF2B5EF4-FFF2-40B4-BE49-F238E27FC236}">
+                <a16:creationId xmlns:a16="http://schemas.microsoft.com/office/drawing/2014/main" id="{A7C8A4B5-A7AA-439C-AD3B-0B6F098CB38A}"/>
+              </a:ext>
+            </a:extLst>
+          </p:cNvPr>
+          <p:cNvSpPr txBox="1"/>
+          <p:nvPr/>
+        </p:nvSpPr>
+        <p:spPr>
+          <a:xfrm>
+            <a:off x="445273" y="1144988"/>
+            <a:ext cx="6106602" cy="4247317"/>
+          </a:xfrm>
+          <a:prstGeom prst="rect">
+            <a:avLst/>
+          </a:prstGeom>
+          <a:noFill/>
+        </p:spPr>
+        <p:txBody>
+          <a:bodyPr wrap="square" rtlCol="0">
+            <a:spAutoFit/>
+          </a:bodyPr>
+          <a:lstStyle/>
+          <a:p>
+            <a:r>
+              <a:rPr lang="en-IN" dirty="0"/>
+              <a:t>We performed the above shown techniques on 2 diabetic retinopathy datasets</a:t>
+            </a:r>
+          </a:p>
+          <a:p>
+            <a:endParaRPr lang="en-IN" dirty="0"/>
+          </a:p>
+          <a:p>
+            <a:pPr marL="342900" indent="-342900">
+              <a:buAutoNum type="arabicPeriod"/>
+            </a:pPr>
+            <a:r>
+              <a:rPr lang="en-IN" dirty="0"/>
+              <a:t>Aptos (contains 3k images)</a:t>
+            </a:r>
+          </a:p>
+          <a:p>
+            <a:pPr marL="342900" indent="-342900">
+              <a:buAutoNum type="arabicPeriod"/>
+            </a:pPr>
+            <a:r>
+              <a:rPr lang="en-IN" dirty="0" err="1"/>
+              <a:t>Eyepacs</a:t>
+            </a:r>
+            <a:r>
+              <a:rPr lang="en-IN" dirty="0"/>
+              <a:t> (contains 30k images)</a:t>
+            </a:r>
+          </a:p>
+          <a:p>
+            <a:pPr marL="342900" indent="-342900">
+              <a:buAutoNum type="arabicPeriod"/>
+            </a:pPr>
+            <a:endParaRPr lang="en-IN" dirty="0"/>
+          </a:p>
+          <a:p>
+            <a:pPr marL="342900" indent="-342900">
+              <a:buAutoNum type="arabicPeriod"/>
+            </a:pPr>
+            <a:endParaRPr lang="en-IN" dirty="0"/>
+          </a:p>
+          <a:p>
+            <a:r>
+              <a:rPr lang="en-IN" dirty="0"/>
+              <a:t>We first train the model with </a:t>
+            </a:r>
+            <a:r>
+              <a:rPr lang="en-IN" dirty="0" err="1"/>
+              <a:t>imagenet</a:t>
+            </a:r>
+            <a:r>
+              <a:rPr lang="en-IN" dirty="0"/>
+              <a:t> initialization on the datasets and then finetune to get the maximum accuracy for the given problem</a:t>
+            </a:r>
+          </a:p>
+          <a:p>
+            <a:endParaRPr lang="en-IN" dirty="0"/>
+          </a:p>
+          <a:p>
+            <a:r>
+              <a:rPr lang="en-IN" dirty="0"/>
+              <a:t>And comparing the accuracy to supervised techniques</a:t>
+            </a:r>
+          </a:p>
+          <a:p>
+            <a:endParaRPr lang="en-IN" dirty="0"/>
+          </a:p>
+          <a:p>
+            <a:r>
+              <a:rPr lang="en-IN" dirty="0"/>
+              <a:t>Using </a:t>
+            </a:r>
+            <a:r>
+              <a:rPr lang="en-IN" dirty="0" err="1"/>
+              <a:t>Eyepacs</a:t>
+            </a:r>
+            <a:r>
+              <a:rPr lang="en-IN" dirty="0"/>
+              <a:t> (30k images) also shows how easily it is scalable to more data</a:t>
             </a:r>
           </a:p>
         </p:txBody>
       </p:sp>
       <p:pic>
         <p:nvPicPr>
-          <p:cNvPr id="5" name="Picture 4">
+          <p:cNvPr id="3" name="Picture Placeholder 4">
             <a:extLst>
               <a:ext uri="{FF2B5EF4-FFF2-40B4-BE49-F238E27FC236}">
-                <a16:creationId xmlns:a16="http://schemas.microsoft.com/office/drawing/2014/main" id="{48F691C9-9269-605D-6A63-08E21778A158}"/>
+                <a16:creationId xmlns:a16="http://schemas.microsoft.com/office/drawing/2014/main" id="{7CBF12F9-5AAC-DC94-F4FC-EF379F56B554}"/>
               </a:ext>
             </a:extLst>
           </p:cNvPr>
@@ -20904,44 +21336,15 @@
         </p:nvPicPr>
         <p:blipFill>
           <a:blip r:embed="rId3"/>
+          <a:srcRect l="24540" r="24540"/>
           <a:stretch>
             <a:fillRect/>
           </a:stretch>
         </p:blipFill>
         <p:spPr>
           <a:xfrm>
-            <a:off x="157527" y="908365"/>
-            <a:ext cx="5216446" cy="3711343"/>
-          </a:xfrm>
-          <a:prstGeom prst="rect">
-            <a:avLst/>
-          </a:prstGeom>
-        </p:spPr>
-      </p:pic>
-      <p:pic>
-        <p:nvPicPr>
-          <p:cNvPr id="7" name="Picture 6">
-            <a:extLst>
-              <a:ext uri="{FF2B5EF4-FFF2-40B4-BE49-F238E27FC236}">
-                <a16:creationId xmlns:a16="http://schemas.microsoft.com/office/drawing/2014/main" id="{EEBD19B5-2EFC-D0A0-0E66-772E229891C4}"/>
-              </a:ext>
-            </a:extLst>
-          </p:cNvPr>
-          <p:cNvPicPr>
-            <a:picLocks noChangeAspect="1"/>
-          </p:cNvPicPr>
-          <p:nvPr/>
-        </p:nvPicPr>
-        <p:blipFill>
-          <a:blip r:embed="rId4"/>
-          <a:stretch>
-            <a:fillRect/>
-          </a:stretch>
-        </p:blipFill>
-        <p:spPr>
-          <a:xfrm>
-            <a:off x="6065084" y="2433099"/>
-            <a:ext cx="6126915" cy="4359114"/>
+            <a:off x="7044856" y="-87464"/>
+            <a:ext cx="5147144" cy="6858000"/>
           </a:xfrm>
           <a:prstGeom prst="rect">
             <a:avLst/>
@@ -20951,7 +21354,7 @@
     </p:spTree>
     <p:extLst>
       <p:ext uri="{BB962C8B-B14F-4D97-AF65-F5344CB8AC3E}">
-        <p14:creationId xmlns:p14="http://schemas.microsoft.com/office/powerpoint/2010/main" val="1904057369"/>
+        <p14:creationId xmlns:p14="http://schemas.microsoft.com/office/powerpoint/2010/main" val="2160295084"/>
       </p:ext>
     </p:extLst>
   </p:cSld>
@@ -21001,27 +21404,22 @@
           <a:lstStyle/>
           <a:p>
             <a:r>
-              <a:rPr lang="en-US" dirty="0" err="1">
+              <a:rPr lang="en-US" dirty="0">
                 <a:solidFill>
                   <a:srgbClr val="5DAAB0"/>
                 </a:solidFill>
               </a:rPr>
-              <a:t>EyePacs</a:t>
-            </a:r>
-            <a:endParaRPr lang="en-US" dirty="0">
-              <a:solidFill>
-                <a:srgbClr val="5DAAB0"/>
-              </a:solidFill>
-            </a:endParaRPr>
+              <a:t>Aptos</a:t>
+            </a:r>
           </a:p>
         </p:txBody>
       </p:sp>
       <p:pic>
         <p:nvPicPr>
-          <p:cNvPr id="3" name="Picture 2">
+          <p:cNvPr id="5" name="Picture 4">
             <a:extLst>
               <a:ext uri="{FF2B5EF4-FFF2-40B4-BE49-F238E27FC236}">
-                <a16:creationId xmlns:a16="http://schemas.microsoft.com/office/drawing/2014/main" id="{3A46F2AA-8134-CF4E-B6F1-33ACEC6F5585}"/>
+                <a16:creationId xmlns:a16="http://schemas.microsoft.com/office/drawing/2014/main" id="{48F691C9-9269-605D-6A63-08E21778A158}"/>
               </a:ext>
             </a:extLst>
           </p:cNvPr>
@@ -21038,8 +21436,8 @@
         </p:blipFill>
         <p:spPr>
           <a:xfrm>
-            <a:off x="5763348" y="2337682"/>
-            <a:ext cx="6322594" cy="4450479"/>
+            <a:off x="157527" y="908365"/>
+            <a:ext cx="5216446" cy="3711343"/>
           </a:xfrm>
           <a:prstGeom prst="rect">
             <a:avLst/>
@@ -21048,10 +21446,10 @@
       </p:pic>
       <p:pic>
         <p:nvPicPr>
-          <p:cNvPr id="6" name="Picture 5">
+          <p:cNvPr id="7" name="Picture 6">
             <a:extLst>
               <a:ext uri="{FF2B5EF4-FFF2-40B4-BE49-F238E27FC236}">
-                <a16:creationId xmlns:a16="http://schemas.microsoft.com/office/drawing/2014/main" id="{8F6633D0-D5E6-1B72-3D80-872990345B84}"/>
+                <a16:creationId xmlns:a16="http://schemas.microsoft.com/office/drawing/2014/main" id="{EEBD19B5-2EFC-D0A0-0E66-772E229891C4}"/>
               </a:ext>
             </a:extLst>
           </p:cNvPr>
@@ -21068,8 +21466,8 @@
         </p:blipFill>
         <p:spPr>
           <a:xfrm>
-            <a:off x="0" y="837502"/>
-            <a:ext cx="5645308" cy="3973737"/>
+            <a:off x="6065084" y="2433099"/>
+            <a:ext cx="6126915" cy="4359114"/>
           </a:xfrm>
           <a:prstGeom prst="rect">
             <a:avLst/>
@@ -21079,7 +21477,7 @@
     </p:spTree>
     <p:extLst>
       <p:ext uri="{BB962C8B-B14F-4D97-AF65-F5344CB8AC3E}">
-        <p14:creationId xmlns:p14="http://schemas.microsoft.com/office/powerpoint/2010/main" val="3922365442"/>
+        <p14:creationId xmlns:p14="http://schemas.microsoft.com/office/powerpoint/2010/main" val="1904057369"/>
       </p:ext>
     </p:extLst>
   </p:cSld>
@@ -21119,32 +21517,37 @@
         <p:spPr>
           <a:xfrm>
             <a:off x="157527" y="182827"/>
-            <a:ext cx="9137548" cy="654675"/>
+            <a:ext cx="7213331" cy="654675"/>
           </a:xfrm>
         </p:spPr>
         <p:txBody>
           <a:bodyPr>
-            <a:normAutofit fontScale="90000"/>
+            <a:normAutofit/>
           </a:bodyPr>
           <a:lstStyle/>
           <a:p>
             <a:r>
-              <a:rPr lang="en-US" dirty="0">
+              <a:rPr lang="en-US" dirty="0" err="1">
                 <a:solidFill>
                   <a:srgbClr val="5DAAB0"/>
                 </a:solidFill>
               </a:rPr>
-              <a:t>Dimensionality Reduction on the Features</a:t>
-            </a:r>
+              <a:t>EyePacs</a:t>
+            </a:r>
+            <a:endParaRPr lang="en-US" dirty="0">
+              <a:solidFill>
+                <a:srgbClr val="5DAAB0"/>
+              </a:solidFill>
+            </a:endParaRPr>
           </a:p>
         </p:txBody>
       </p:sp>
       <p:pic>
         <p:nvPicPr>
-          <p:cNvPr id="4" name="Picture 3">
+          <p:cNvPr id="3" name="Picture 2">
             <a:extLst>
               <a:ext uri="{FF2B5EF4-FFF2-40B4-BE49-F238E27FC236}">
-                <a16:creationId xmlns:a16="http://schemas.microsoft.com/office/drawing/2014/main" id="{A6242C62-35E9-C940-6701-C4281CDAE66C}"/>
+                <a16:creationId xmlns:a16="http://schemas.microsoft.com/office/drawing/2014/main" id="{3A46F2AA-8134-CF4E-B6F1-33ACEC6F5585}"/>
               </a:ext>
             </a:extLst>
           </p:cNvPr>
@@ -21161,8 +21564,8 @@
         </p:blipFill>
         <p:spPr>
           <a:xfrm>
-            <a:off x="0" y="837502"/>
-            <a:ext cx="3810000" cy="3535715"/>
+            <a:off x="5763348" y="2337682"/>
+            <a:ext cx="6322594" cy="4450479"/>
           </a:xfrm>
           <a:prstGeom prst="rect">
             <a:avLst/>
@@ -21171,10 +21574,10 @@
       </p:pic>
       <p:pic>
         <p:nvPicPr>
-          <p:cNvPr id="7" name="Picture 6">
+          <p:cNvPr id="6" name="Picture 5">
             <a:extLst>
               <a:ext uri="{FF2B5EF4-FFF2-40B4-BE49-F238E27FC236}">
-                <a16:creationId xmlns:a16="http://schemas.microsoft.com/office/drawing/2014/main" id="{FF6CF529-850E-3299-88EB-2150E29BA6D8}"/>
+                <a16:creationId xmlns:a16="http://schemas.microsoft.com/office/drawing/2014/main" id="{8F6633D0-D5E6-1B72-3D80-872990345B84}"/>
               </a:ext>
             </a:extLst>
           </p:cNvPr>
@@ -21191,154 +21594,18 @@
         </p:blipFill>
         <p:spPr>
           <a:xfrm>
-            <a:off x="8382000" y="781842"/>
-            <a:ext cx="3754339" cy="3591375"/>
+            <a:off x="0" y="837502"/>
+            <a:ext cx="5645308" cy="3973737"/>
           </a:xfrm>
           <a:prstGeom prst="rect">
             <a:avLst/>
           </a:prstGeom>
         </p:spPr>
       </p:pic>
-      <p:pic>
-        <p:nvPicPr>
-          <p:cNvPr id="10" name="Picture 9">
-            <a:extLst>
-              <a:ext uri="{FF2B5EF4-FFF2-40B4-BE49-F238E27FC236}">
-                <a16:creationId xmlns:a16="http://schemas.microsoft.com/office/drawing/2014/main" id="{C33655DF-0200-AAED-EE15-5A55AF802180}"/>
-              </a:ext>
-            </a:extLst>
-          </p:cNvPr>
-          <p:cNvPicPr>
-            <a:picLocks noChangeAspect="1"/>
-          </p:cNvPicPr>
-          <p:nvPr/>
-        </p:nvPicPr>
-        <p:blipFill>
-          <a:blip r:embed="rId5"/>
-          <a:stretch>
-            <a:fillRect/>
-          </a:stretch>
-        </p:blipFill>
-        <p:spPr>
-          <a:xfrm>
-            <a:off x="3810000" y="2496710"/>
-            <a:ext cx="4572000" cy="4361290"/>
-          </a:xfrm>
-          <a:prstGeom prst="rect">
-            <a:avLst/>
-          </a:prstGeom>
-        </p:spPr>
-      </p:pic>
-      <p:sp>
-        <p:nvSpPr>
-          <p:cNvPr id="11" name="TextBox 10">
-            <a:extLst>
-              <a:ext uri="{FF2B5EF4-FFF2-40B4-BE49-F238E27FC236}">
-                <a16:creationId xmlns:a16="http://schemas.microsoft.com/office/drawing/2014/main" id="{C54CB3D2-08F1-41B5-8771-D8256A4A33F2}"/>
-              </a:ext>
-            </a:extLst>
-          </p:cNvPr>
-          <p:cNvSpPr txBox="1"/>
-          <p:nvPr/>
-        </p:nvSpPr>
-        <p:spPr>
-          <a:xfrm>
-            <a:off x="1316604" y="4492689"/>
-            <a:ext cx="1176793" cy="369332"/>
-          </a:xfrm>
-          <a:prstGeom prst="rect">
-            <a:avLst/>
-          </a:prstGeom>
-          <a:noFill/>
-        </p:spPr>
-        <p:txBody>
-          <a:bodyPr wrap="square" rtlCol="0">
-            <a:spAutoFit/>
-          </a:bodyPr>
-          <a:lstStyle/>
-          <a:p>
-            <a:r>
-              <a:rPr lang="en-IN" dirty="0" err="1"/>
-              <a:t>Imagenet</a:t>
-            </a:r>
-            <a:endParaRPr lang="en-IN" dirty="0"/>
-          </a:p>
-        </p:txBody>
-      </p:sp>
-      <p:sp>
-        <p:nvSpPr>
-          <p:cNvPr id="12" name="TextBox 11">
-            <a:extLst>
-              <a:ext uri="{FF2B5EF4-FFF2-40B4-BE49-F238E27FC236}">
-                <a16:creationId xmlns:a16="http://schemas.microsoft.com/office/drawing/2014/main" id="{C4B239CD-D28A-1513-4EFC-FC20247A18D9}"/>
-              </a:ext>
-            </a:extLst>
-          </p:cNvPr>
-          <p:cNvSpPr txBox="1"/>
-          <p:nvPr/>
-        </p:nvSpPr>
-        <p:spPr>
-          <a:xfrm>
-            <a:off x="5738854" y="1798522"/>
-            <a:ext cx="1176793" cy="369332"/>
-          </a:xfrm>
-          <a:prstGeom prst="rect">
-            <a:avLst/>
-          </a:prstGeom>
-          <a:noFill/>
-        </p:spPr>
-        <p:txBody>
-          <a:bodyPr wrap="square" rtlCol="0">
-            <a:spAutoFit/>
-          </a:bodyPr>
-          <a:lstStyle/>
-          <a:p>
-            <a:r>
-              <a:rPr lang="en-IN" dirty="0"/>
-              <a:t>Dino</a:t>
-            </a:r>
-          </a:p>
-        </p:txBody>
-      </p:sp>
-      <p:sp>
-        <p:nvSpPr>
-          <p:cNvPr id="13" name="TextBox 12">
-            <a:extLst>
-              <a:ext uri="{FF2B5EF4-FFF2-40B4-BE49-F238E27FC236}">
-                <a16:creationId xmlns:a16="http://schemas.microsoft.com/office/drawing/2014/main" id="{25A32300-88EF-6DAE-9E2A-C3AFA53CF04D}"/>
-              </a:ext>
-            </a:extLst>
-          </p:cNvPr>
-          <p:cNvSpPr txBox="1"/>
-          <p:nvPr/>
-        </p:nvSpPr>
-        <p:spPr>
-          <a:xfrm>
-            <a:off x="10064364" y="4492689"/>
-            <a:ext cx="1176793" cy="369332"/>
-          </a:xfrm>
-          <a:prstGeom prst="rect">
-            <a:avLst/>
-          </a:prstGeom>
-          <a:noFill/>
-        </p:spPr>
-        <p:txBody>
-          <a:bodyPr wrap="square" rtlCol="0">
-            <a:spAutoFit/>
-          </a:bodyPr>
-          <a:lstStyle/>
-          <a:p>
-            <a:r>
-              <a:rPr lang="en-IN" dirty="0"/>
-              <a:t>DVME</a:t>
-            </a:r>
-          </a:p>
-        </p:txBody>
-      </p:sp>
     </p:spTree>
     <p:extLst>
       <p:ext uri="{BB962C8B-B14F-4D97-AF65-F5344CB8AC3E}">
-        <p14:creationId xmlns:p14="http://schemas.microsoft.com/office/powerpoint/2010/main" val="2404794640"/>
+        <p14:creationId xmlns:p14="http://schemas.microsoft.com/office/powerpoint/2010/main" val="3922365442"/>
       </p:ext>
     </p:extLst>
   </p:cSld>
@@ -21383,7 +21650,7 @@
         </p:spPr>
         <p:txBody>
           <a:bodyPr>
-            <a:normAutofit/>
+            <a:normAutofit fontScale="90000"/>
           </a:bodyPr>
           <a:lstStyle/>
           <a:p>
@@ -21393,17 +21660,17 @@
                   <a:srgbClr val="5DAAB0"/>
                 </a:solidFill>
               </a:rPr>
-              <a:t>Results using proposed system</a:t>
+              <a:t>Dimensionality Reduction on the Features</a:t>
             </a:r>
           </a:p>
         </p:txBody>
       </p:sp>
       <p:pic>
         <p:nvPicPr>
-          <p:cNvPr id="6" name="Picture 5">
+          <p:cNvPr id="4" name="Picture 3">
             <a:extLst>
               <a:ext uri="{FF2B5EF4-FFF2-40B4-BE49-F238E27FC236}">
-                <a16:creationId xmlns:a16="http://schemas.microsoft.com/office/drawing/2014/main" id="{01CD768F-1D10-B037-AD63-9009B37B8C42}"/>
+                <a16:creationId xmlns:a16="http://schemas.microsoft.com/office/drawing/2014/main" id="{A6242C62-35E9-C940-6701-C4281CDAE66C}"/>
               </a:ext>
             </a:extLst>
           </p:cNvPr>
@@ -21420,8 +21687,8 @@
         </p:blipFill>
         <p:spPr>
           <a:xfrm>
-            <a:off x="373829" y="1832748"/>
-            <a:ext cx="4115374" cy="3648584"/>
+            <a:off x="0" y="837502"/>
+            <a:ext cx="3810000" cy="3535715"/>
           </a:xfrm>
           <a:prstGeom prst="rect">
             <a:avLst/>
@@ -21430,10 +21697,10 @@
       </p:pic>
       <p:pic>
         <p:nvPicPr>
-          <p:cNvPr id="14" name="Picture 13">
+          <p:cNvPr id="7" name="Picture 6">
             <a:extLst>
               <a:ext uri="{FF2B5EF4-FFF2-40B4-BE49-F238E27FC236}">
-                <a16:creationId xmlns:a16="http://schemas.microsoft.com/office/drawing/2014/main" id="{0FFF614D-C712-0C69-9D9A-8397E89F3F11}"/>
+                <a16:creationId xmlns:a16="http://schemas.microsoft.com/office/drawing/2014/main" id="{FF6CF529-850E-3299-88EB-2150E29BA6D8}"/>
               </a:ext>
             </a:extLst>
           </p:cNvPr>
@@ -21450,20 +21717,50 @@
         </p:blipFill>
         <p:spPr>
           <a:xfrm>
-            <a:off x="7843800" y="1889906"/>
-            <a:ext cx="4105848" cy="3591426"/>
+            <a:off x="8382000" y="781842"/>
+            <a:ext cx="3754339" cy="3591375"/>
           </a:xfrm>
           <a:prstGeom prst="rect">
             <a:avLst/>
           </a:prstGeom>
         </p:spPr>
       </p:pic>
-      <p:sp>
-        <p:nvSpPr>
-          <p:cNvPr id="15" name="TextBox 14">
+      <p:pic>
+        <p:nvPicPr>
+          <p:cNvPr id="10" name="Picture 9">
             <a:extLst>
               <a:ext uri="{FF2B5EF4-FFF2-40B4-BE49-F238E27FC236}">
-                <a16:creationId xmlns:a16="http://schemas.microsoft.com/office/drawing/2014/main" id="{41AA2E0F-91C9-DD4C-99E0-27437D567E17}"/>
+                <a16:creationId xmlns:a16="http://schemas.microsoft.com/office/drawing/2014/main" id="{C33655DF-0200-AAED-EE15-5A55AF802180}"/>
+              </a:ext>
+            </a:extLst>
+          </p:cNvPr>
+          <p:cNvPicPr>
+            <a:picLocks noChangeAspect="1"/>
+          </p:cNvPicPr>
+          <p:nvPr/>
+        </p:nvPicPr>
+        <p:blipFill>
+          <a:blip r:embed="rId5"/>
+          <a:stretch>
+            <a:fillRect/>
+          </a:stretch>
+        </p:blipFill>
+        <p:spPr>
+          <a:xfrm>
+            <a:off x="3810000" y="2496710"/>
+            <a:ext cx="4572000" cy="4361290"/>
+          </a:xfrm>
+          <a:prstGeom prst="rect">
+            <a:avLst/>
+          </a:prstGeom>
+        </p:spPr>
+      </p:pic>
+      <p:sp>
+        <p:nvSpPr>
+          <p:cNvPr id="11" name="TextBox 10">
+            <a:extLst>
+              <a:ext uri="{FF2B5EF4-FFF2-40B4-BE49-F238E27FC236}">
+                <a16:creationId xmlns:a16="http://schemas.microsoft.com/office/drawing/2014/main" id="{C54CB3D2-08F1-41B5-8771-D8256A4A33F2}"/>
               </a:ext>
             </a:extLst>
           </p:cNvPr>
@@ -21472,8 +21769,8 @@
         </p:nvSpPr>
         <p:spPr>
           <a:xfrm>
-            <a:off x="1558456" y="5740841"/>
-            <a:ext cx="1550504" cy="369332"/>
+            <a:off x="1316604" y="4492689"/>
+            <a:ext cx="1176793" cy="369332"/>
           </a:xfrm>
           <a:prstGeom prst="rect">
             <a:avLst/>
@@ -21487,18 +21784,19 @@
           <a:lstStyle/>
           <a:p>
             <a:r>
-              <a:rPr lang="en-IN" dirty="0"/>
-              <a:t>Linear Eval</a:t>
-            </a:r>
-          </a:p>
-        </p:txBody>
-      </p:sp>
-      <p:sp>
-        <p:nvSpPr>
-          <p:cNvPr id="16" name="TextBox 15">
+              <a:rPr lang="en-IN" dirty="0" err="1"/>
+              <a:t>Imagenet</a:t>
+            </a:r>
+            <a:endParaRPr lang="en-IN" dirty="0"/>
+          </a:p>
+        </p:txBody>
+      </p:sp>
+      <p:sp>
+        <p:nvSpPr>
+          <p:cNvPr id="12" name="TextBox 11">
             <a:extLst>
               <a:ext uri="{FF2B5EF4-FFF2-40B4-BE49-F238E27FC236}">
-                <a16:creationId xmlns:a16="http://schemas.microsoft.com/office/drawing/2014/main" id="{E2E93ED2-A8FC-DB79-09CA-526F21B5A51C}"/>
+                <a16:creationId xmlns:a16="http://schemas.microsoft.com/office/drawing/2014/main" id="{C4B239CD-D28A-1513-4EFC-FC20247A18D9}"/>
               </a:ext>
             </a:extLst>
           </p:cNvPr>
@@ -21507,8 +21805,8 @@
         </p:nvSpPr>
         <p:spPr>
           <a:xfrm>
-            <a:off x="9295075" y="5740841"/>
-            <a:ext cx="1447138" cy="369332"/>
+            <a:off x="5738854" y="1798522"/>
+            <a:ext cx="1176793" cy="369332"/>
           </a:xfrm>
           <a:prstGeom prst="rect">
             <a:avLst/>
@@ -21523,7 +21821,42 @@
           <a:p>
             <a:r>
               <a:rPr lang="en-IN" dirty="0"/>
-              <a:t>Fine tune</a:t>
+              <a:t>Dino</a:t>
+            </a:r>
+          </a:p>
+        </p:txBody>
+      </p:sp>
+      <p:sp>
+        <p:nvSpPr>
+          <p:cNvPr id="13" name="TextBox 12">
+            <a:extLst>
+              <a:ext uri="{FF2B5EF4-FFF2-40B4-BE49-F238E27FC236}">
+                <a16:creationId xmlns:a16="http://schemas.microsoft.com/office/drawing/2014/main" id="{25A32300-88EF-6DAE-9E2A-C3AFA53CF04D}"/>
+              </a:ext>
+            </a:extLst>
+          </p:cNvPr>
+          <p:cNvSpPr txBox="1"/>
+          <p:nvPr/>
+        </p:nvSpPr>
+        <p:spPr>
+          <a:xfrm>
+            <a:off x="10064364" y="4492689"/>
+            <a:ext cx="1176793" cy="369332"/>
+          </a:xfrm>
+          <a:prstGeom prst="rect">
+            <a:avLst/>
+          </a:prstGeom>
+          <a:noFill/>
+        </p:spPr>
+        <p:txBody>
+          <a:bodyPr wrap="square" rtlCol="0">
+            <a:spAutoFit/>
+          </a:bodyPr>
+          <a:lstStyle/>
+          <a:p>
+            <a:r>
+              <a:rPr lang="en-IN" dirty="0"/>
+              <a:t>DVME</a:t>
             </a:r>
           </a:p>
         </p:txBody>
@@ -21531,7 +21864,7 @@
     </p:spTree>
     <p:extLst>
       <p:ext uri="{BB962C8B-B14F-4D97-AF65-F5344CB8AC3E}">
-        <p14:creationId xmlns:p14="http://schemas.microsoft.com/office/powerpoint/2010/main" val="684102265"/>
+        <p14:creationId xmlns:p14="http://schemas.microsoft.com/office/powerpoint/2010/main" val="2404794640"/>
       </p:ext>
     </p:extLst>
   </p:cSld>
@@ -21752,6 +22085,199 @@
       </p:sp>
       <p:pic>
         <p:nvPicPr>
+          <p:cNvPr id="6" name="Picture 5">
+            <a:extLst>
+              <a:ext uri="{FF2B5EF4-FFF2-40B4-BE49-F238E27FC236}">
+                <a16:creationId xmlns:a16="http://schemas.microsoft.com/office/drawing/2014/main" id="{01CD768F-1D10-B037-AD63-9009B37B8C42}"/>
+              </a:ext>
+            </a:extLst>
+          </p:cNvPr>
+          <p:cNvPicPr>
+            <a:picLocks noChangeAspect="1"/>
+          </p:cNvPicPr>
+          <p:nvPr/>
+        </p:nvPicPr>
+        <p:blipFill>
+          <a:blip r:embed="rId3"/>
+          <a:stretch>
+            <a:fillRect/>
+          </a:stretch>
+        </p:blipFill>
+        <p:spPr>
+          <a:xfrm>
+            <a:off x="373829" y="1832748"/>
+            <a:ext cx="4115374" cy="3648584"/>
+          </a:xfrm>
+          <a:prstGeom prst="rect">
+            <a:avLst/>
+          </a:prstGeom>
+        </p:spPr>
+      </p:pic>
+      <p:pic>
+        <p:nvPicPr>
+          <p:cNvPr id="14" name="Picture 13">
+            <a:extLst>
+              <a:ext uri="{FF2B5EF4-FFF2-40B4-BE49-F238E27FC236}">
+                <a16:creationId xmlns:a16="http://schemas.microsoft.com/office/drawing/2014/main" id="{0FFF614D-C712-0C69-9D9A-8397E89F3F11}"/>
+              </a:ext>
+            </a:extLst>
+          </p:cNvPr>
+          <p:cNvPicPr>
+            <a:picLocks noChangeAspect="1"/>
+          </p:cNvPicPr>
+          <p:nvPr/>
+        </p:nvPicPr>
+        <p:blipFill>
+          <a:blip r:embed="rId4"/>
+          <a:stretch>
+            <a:fillRect/>
+          </a:stretch>
+        </p:blipFill>
+        <p:spPr>
+          <a:xfrm>
+            <a:off x="7843800" y="1889906"/>
+            <a:ext cx="4105848" cy="3591426"/>
+          </a:xfrm>
+          <a:prstGeom prst="rect">
+            <a:avLst/>
+          </a:prstGeom>
+        </p:spPr>
+      </p:pic>
+      <p:sp>
+        <p:nvSpPr>
+          <p:cNvPr id="15" name="TextBox 14">
+            <a:extLst>
+              <a:ext uri="{FF2B5EF4-FFF2-40B4-BE49-F238E27FC236}">
+                <a16:creationId xmlns:a16="http://schemas.microsoft.com/office/drawing/2014/main" id="{41AA2E0F-91C9-DD4C-99E0-27437D567E17}"/>
+              </a:ext>
+            </a:extLst>
+          </p:cNvPr>
+          <p:cNvSpPr txBox="1"/>
+          <p:nvPr/>
+        </p:nvSpPr>
+        <p:spPr>
+          <a:xfrm>
+            <a:off x="1558456" y="5740841"/>
+            <a:ext cx="1550504" cy="369332"/>
+          </a:xfrm>
+          <a:prstGeom prst="rect">
+            <a:avLst/>
+          </a:prstGeom>
+          <a:noFill/>
+        </p:spPr>
+        <p:txBody>
+          <a:bodyPr wrap="square" rtlCol="0">
+            <a:spAutoFit/>
+          </a:bodyPr>
+          <a:lstStyle/>
+          <a:p>
+            <a:r>
+              <a:rPr lang="en-IN" dirty="0"/>
+              <a:t>Linear Eval</a:t>
+            </a:r>
+          </a:p>
+        </p:txBody>
+      </p:sp>
+      <p:sp>
+        <p:nvSpPr>
+          <p:cNvPr id="16" name="TextBox 15">
+            <a:extLst>
+              <a:ext uri="{FF2B5EF4-FFF2-40B4-BE49-F238E27FC236}">
+                <a16:creationId xmlns:a16="http://schemas.microsoft.com/office/drawing/2014/main" id="{E2E93ED2-A8FC-DB79-09CA-526F21B5A51C}"/>
+              </a:ext>
+            </a:extLst>
+          </p:cNvPr>
+          <p:cNvSpPr txBox="1"/>
+          <p:nvPr/>
+        </p:nvSpPr>
+        <p:spPr>
+          <a:xfrm>
+            <a:off x="9295075" y="5740841"/>
+            <a:ext cx="1447138" cy="369332"/>
+          </a:xfrm>
+          <a:prstGeom prst="rect">
+            <a:avLst/>
+          </a:prstGeom>
+          <a:noFill/>
+        </p:spPr>
+        <p:txBody>
+          <a:bodyPr wrap="square" rtlCol="0">
+            <a:spAutoFit/>
+          </a:bodyPr>
+          <a:lstStyle/>
+          <a:p>
+            <a:r>
+              <a:rPr lang="en-IN" dirty="0"/>
+              <a:t>Fine tune</a:t>
+            </a:r>
+          </a:p>
+        </p:txBody>
+      </p:sp>
+    </p:spTree>
+    <p:extLst>
+      <p:ext uri="{BB962C8B-B14F-4D97-AF65-F5344CB8AC3E}">
+        <p14:creationId xmlns:p14="http://schemas.microsoft.com/office/powerpoint/2010/main" val="684102265"/>
+      </p:ext>
+    </p:extLst>
+  </p:cSld>
+  <p:clrMapOvr>
+    <a:masterClrMapping/>
+  </p:clrMapOvr>
+</p:sld>
+</file>
+
+<file path=ppt/slides/slide31.xml><?xml version="1.0" encoding="utf-8"?>
+<p:sld xmlns:a="http://schemas.openxmlformats.org/drawingml/2006/main" xmlns:r="http://schemas.openxmlformats.org/officeDocument/2006/relationships" xmlns:p="http://schemas.openxmlformats.org/presentationml/2006/main">
+  <p:cSld>
+    <p:spTree>
+      <p:nvGrpSpPr>
+        <p:cNvPr id="1" name=""/>
+        <p:cNvGrpSpPr/>
+        <p:nvPr/>
+      </p:nvGrpSpPr>
+      <p:grpSpPr>
+        <a:xfrm>
+          <a:off x="0" y="0"/>
+          <a:ext cx="0" cy="0"/>
+          <a:chOff x="0" y="0"/>
+          <a:chExt cx="0" cy="0"/>
+        </a:xfrm>
+      </p:grpSpPr>
+      <p:sp>
+        <p:nvSpPr>
+          <p:cNvPr id="8" name="Title 7"/>
+          <p:cNvSpPr>
+            <a:spLocks noGrp="1"/>
+          </p:cNvSpPr>
+          <p:nvPr>
+            <p:ph type="title"/>
+          </p:nvPr>
+        </p:nvSpPr>
+        <p:spPr>
+          <a:xfrm>
+            <a:off x="157527" y="182827"/>
+            <a:ext cx="9137548" cy="654675"/>
+          </a:xfrm>
+        </p:spPr>
+        <p:txBody>
+          <a:bodyPr>
+            <a:normAutofit/>
+          </a:bodyPr>
+          <a:lstStyle/>
+          <a:p>
+            <a:r>
+              <a:rPr lang="en-US" dirty="0">
+                <a:solidFill>
+                  <a:srgbClr val="5DAAB0"/>
+                </a:solidFill>
+              </a:rPr>
+              <a:t>Results using proposed system</a:t>
+            </a:r>
+          </a:p>
+        </p:txBody>
+      </p:sp>
+      <p:pic>
+        <p:nvPicPr>
           <p:cNvPr id="2" name="Picture 1">
             <a:extLst>
               <a:ext uri="{FF2B5EF4-FFF2-40B4-BE49-F238E27FC236}">
@@ -21823,7 +22349,7 @@
 </p:sld>
 </file>
 
-<file path=ppt/slides/slide31.xml><?xml version="1.0" encoding="utf-8"?>
+<file path=ppt/slides/slide32.xml><?xml version="1.0" encoding="utf-8"?>
 <p:sld xmlns:a="http://schemas.openxmlformats.org/drawingml/2006/main" xmlns:r="http://schemas.openxmlformats.org/officeDocument/2006/relationships" xmlns:p="http://schemas.openxmlformats.org/presentationml/2006/main">
   <p:cSld>
     <p:spTree>

</xml_diff>